<commit_message>
- Sửa lỗi chính tả, cập nhật báo cáo - Sửa lỗi hiển thị số nhà tên đường
</commit_message>
<xml_diff>
--- a/Bao cao Nhom.pptx
+++ b/Bao cao Nhom.pptx
@@ -6,7 +6,7 @@
     <p:sldMasterId id="2147483660" r:id="rId3"/>
   </p:sldMasterIdLst>
   <p:notesMasterIdLst>
-    <p:notesMasterId r:id="rId14"/>
+    <p:notesMasterId r:id="rId15"/>
   </p:notesMasterIdLst>
   <p:sldIdLst>
     <p:sldId id="281" r:id="rId4"/>
@@ -16,9 +16,10 @@
     <p:sldId id="305" r:id="rId8"/>
     <p:sldId id="306" r:id="rId9"/>
     <p:sldId id="307" r:id="rId10"/>
-    <p:sldId id="308" r:id="rId11"/>
-    <p:sldId id="301" r:id="rId12"/>
-    <p:sldId id="276" r:id="rId13"/>
+    <p:sldId id="312" r:id="rId11"/>
+    <p:sldId id="311" r:id="rId12"/>
+    <p:sldId id="301" r:id="rId13"/>
+    <p:sldId id="276" r:id="rId14"/>
   </p:sldIdLst>
   <p:sldSz cx="12192000" cy="6858000"/>
   <p:notesSz cx="6858000" cy="9144000"/>
@@ -7273,7 +7274,7 @@
               </a:tabLst>
             </a:pPr>
             <a:r>
-              <a:rPr lang="en-US" b="1" smtClean="0">
+              <a:rPr lang="en-US" b="1">
                 <a:latin typeface="Tahoma" pitchFamily="34" charset="0"/>
                 <a:ea typeface="Tahoma" pitchFamily="34" charset="0"/>
                 <a:cs typeface="Tahoma" pitchFamily="34" charset="0"/>
@@ -7294,31 +7295,7 @@
                 <a:ea typeface="Tahoma" pitchFamily="34" charset="0"/>
                 <a:cs typeface="Tahoma" pitchFamily="34" charset="0"/>
               </a:rPr>
-              <a:t> </a:t>
-            </a:r>
-            <a:r>
-              <a:rPr lang="en-US" b="1" smtClean="0">
-                <a:latin typeface="Tahoma" pitchFamily="34" charset="0"/>
-                <a:ea typeface="Tahoma" pitchFamily="34" charset="0"/>
-                <a:cs typeface="Tahoma" pitchFamily="34" charset="0"/>
-              </a:rPr>
-              <a:t>hiện:</a:t>
-            </a:r>
-            <a:r>
-              <a:rPr lang="en-US" b="1">
-                <a:latin typeface="Tahoma" pitchFamily="34" charset="0"/>
-                <a:ea typeface="Tahoma" pitchFamily="34" charset="0"/>
-                <a:cs typeface="Tahoma" pitchFamily="34" charset="0"/>
-              </a:rPr>
-              <a:t>	</a:t>
-            </a:r>
-            <a:r>
-              <a:rPr lang="en-US" b="1" smtClean="0">
-                <a:latin typeface="Tahoma" pitchFamily="34" charset="0"/>
-                <a:ea typeface="Tahoma" pitchFamily="34" charset="0"/>
-                <a:cs typeface="Tahoma" pitchFamily="34" charset="0"/>
-              </a:rPr>
-              <a:t>	Giảng viên:</a:t>
+              <a:t> hiện:		Giảng viên:</a:t>
             </a:r>
             <a:endParaRPr lang="en-US" b="1">
               <a:latin typeface="Tahoma" pitchFamily="34" charset="0"/>
@@ -7336,20 +7313,12 @@
               </a:tabLst>
             </a:pPr>
             <a:r>
-              <a:rPr lang="en-US" b="1" smtClean="0">
-                <a:latin typeface="Tahoma" pitchFamily="34" charset="0"/>
-                <a:ea typeface="Tahoma" pitchFamily="34" charset="0"/>
-                <a:cs typeface="Tahoma" pitchFamily="34" charset="0"/>
-              </a:rPr>
-              <a:t>     1</a:t>
-            </a:r>
-            <a:r>
               <a:rPr lang="en-US" b="1">
                 <a:latin typeface="Tahoma" pitchFamily="34" charset="0"/>
                 <a:ea typeface="Tahoma" pitchFamily="34" charset="0"/>
                 <a:cs typeface="Tahoma" pitchFamily="34" charset="0"/>
               </a:rPr>
-              <a:t>. </a:t>
+              <a:t>     1.  </a:t>
             </a:r>
             <a:r>
               <a:rPr b="1">
@@ -7366,23 +7335,7 @@
                 <a:ea typeface="Tahoma" pitchFamily="34" charset="0"/>
                 <a:cs typeface="Tahoma" pitchFamily="34" charset="0"/>
               </a:rPr>
-              <a:t>	 </a:t>
-            </a:r>
-            <a:r>
-              <a:rPr lang="en-US" b="1" smtClean="0">
-                <a:latin typeface="Tahoma" pitchFamily="34" charset="0"/>
-                <a:ea typeface="Tahoma" pitchFamily="34" charset="0"/>
-                <a:cs typeface="Tahoma" pitchFamily="34" charset="0"/>
-              </a:rPr>
-              <a:t>   TS</a:t>
-            </a:r>
-            <a:r>
-              <a:rPr lang="en-US" b="1">
-                <a:latin typeface="Tahoma" pitchFamily="34" charset="0"/>
-                <a:ea typeface="Tahoma" pitchFamily="34" charset="0"/>
-                <a:cs typeface="Tahoma" pitchFamily="34" charset="0"/>
-              </a:rPr>
-              <a:t>. </a:t>
+              <a:t>	    TS. </a:t>
             </a:r>
             <a:r>
               <a:rPr lang="en-US" altLang="en-US" b="1">
@@ -7408,7 +7361,7 @@
               </a:tabLst>
             </a:pPr>
             <a:r>
-              <a:rPr lang="en-US" b="1" smtClean="0">
+              <a:rPr lang="en-US" b="1">
                 <a:latin typeface="Tahoma" pitchFamily="34" charset="0"/>
                 <a:ea typeface="Tahoma" pitchFamily="34" charset="0"/>
                 <a:cs typeface="Tahoma" pitchFamily="34" charset="0"/>
@@ -7416,7 +7369,7 @@
               <a:t>     </a:t>
             </a:r>
             <a:r>
-              <a:rPr lang="en-US" altLang="en-US" b="1" smtClean="0">
+              <a:rPr lang="en-US" altLang="en-US" b="1">
                 <a:latin typeface="Tahoma" pitchFamily="34" charset="0"/>
                 <a:ea typeface="Tahoma" pitchFamily="34" charset="0"/>
                 <a:cs typeface="Tahoma" pitchFamily="34" charset="0"/>
@@ -7536,7 +7489,7 @@
               <a:buNone/>
             </a:pPr>
             <a:r>
-              <a:rPr lang="en-US" altLang="en-US" sz="3600" b="1" cap="all" smtClean="0">
+              <a:rPr lang="en-US" altLang="en-US" sz="3600" b="1" cap="all">
                 <a:solidFill>
                   <a:schemeClr val="accent5">
                     <a:lumMod val="75000"/>
@@ -7551,7 +7504,7 @@
               <a:t>Hệ thống quản lý khu trọ Quận Cái Răng</a:t>
             </a:r>
             <a:r>
-              <a:rPr lang="en-US" altLang="en-US" sz="3600" b="1" smtClean="0">
+              <a:rPr lang="en-US" altLang="en-US" sz="3600" b="1">
                 <a:solidFill>
                   <a:schemeClr val="accent5">
                     <a:lumMod val="75000"/>
@@ -7564,7 +7517,7 @@
               </a:rPr>
               <a:t> </a:t>
             </a:r>
-            <a:endParaRPr lang="en-US" altLang="en-US" sz="3600" b="1" smtClean="0">
+            <a:endParaRPr lang="en-US" altLang="en-US" sz="3600" b="1">
               <a:solidFill>
                 <a:schemeClr val="accent5">
                   <a:lumMod val="75000"/>
@@ -7607,17 +7560,532 @@
   <p:clrMapOvr>
     <a:masterClrMapping/>
   </p:clrMapOvr>
-  <p:timing>
-    <p:tnLst>
-      <p:par>
-        <p:cTn id="1" dur="indefinite" restart="never" nodeType="tmRoot"/>
-      </p:par>
-    </p:tnLst>
-  </p:timing>
 </p:sld>
 </file>
 
 <file path=ppt/slides/slide10.xml><?xml version="1.0" encoding="utf-8"?>
+<p:sld xmlns:a="http://schemas.openxmlformats.org/drawingml/2006/main" xmlns:r="http://schemas.openxmlformats.org/officeDocument/2006/relationships" xmlns:p="http://schemas.openxmlformats.org/presentationml/2006/main">
+  <p:cSld>
+    <p:spTree>
+      <p:nvGrpSpPr>
+        <p:cNvPr id="1" name=""/>
+        <p:cNvGrpSpPr/>
+        <p:nvPr/>
+      </p:nvGrpSpPr>
+      <p:grpSpPr>
+        <a:xfrm>
+          <a:off x="0" y="0"/>
+          <a:ext cx="0" cy="0"/>
+          <a:chOff x="0" y="0"/>
+          <a:chExt cx="0" cy="0"/>
+        </a:xfrm>
+      </p:grpSpPr>
+      <p:sp>
+        <p:nvSpPr>
+          <p:cNvPr id="2" name="Title 1"/>
+          <p:cNvSpPr>
+            <a:spLocks noGrp="true"/>
+          </p:cNvSpPr>
+          <p:nvPr>
+            <p:ph type="title"/>
+          </p:nvPr>
+        </p:nvSpPr>
+        <p:spPr>
+          <a:xfrm>
+            <a:off x="-1" y="1"/>
+            <a:ext cx="7467601" cy="1167318"/>
+          </a:xfrm>
+          <a:solidFill>
+            <a:schemeClr val="accent5"/>
+          </a:solidFill>
+        </p:spPr>
+        <p:txBody>
+          <a:bodyPr>
+            <a:normAutofit/>
+          </a:bodyPr>
+          <a:lstStyle/>
+          <a:p>
+            <a:pPr algn="ctr">
+              <a:lnSpc>
+                <a:spcPct val="100000"/>
+              </a:lnSpc>
+            </a:pPr>
+            <a:r>
+              <a:rPr lang="en-US" sz="3200" b="1">
+                <a:solidFill>
+                  <a:schemeClr val="bg1"/>
+                </a:solidFill>
+                <a:latin typeface="Arial" panose="020B0604020202020204" pitchFamily="34" charset="0"/>
+                <a:cs typeface="Arial" panose="020B0604020202020204" pitchFamily="34" charset="0"/>
+                <a:sym typeface="+mn-ea"/>
+              </a:rPr>
+              <a:t>HỆ THỐNG</a:t>
+            </a:r>
+            <a:r>
+              <a:rPr lang="en-US" altLang="en-US" sz="3200" b="1">
+                <a:solidFill>
+                  <a:schemeClr val="bg1"/>
+                </a:solidFill>
+                <a:latin typeface="Arial" panose="020B0604020202020204" pitchFamily="34" charset="0"/>
+                <a:cs typeface="Arial" panose="020B0604020202020204" pitchFamily="34" charset="0"/>
+                <a:sym typeface="+mn-ea"/>
+              </a:rPr>
+              <a:t> QUẢN LÝ KHU TRỌ QUẬN CÁI RĂNG</a:t>
+            </a:r>
+            <a:endParaRPr lang="en-US" sz="3200" b="1">
+              <a:solidFill>
+                <a:schemeClr val="bg1"/>
+              </a:solidFill>
+              <a:latin typeface="Arial" panose="020B0604020202020204" pitchFamily="34" charset="0"/>
+              <a:cs typeface="Arial" panose="020B0604020202020204" pitchFamily="34" charset="0"/>
+            </a:endParaRPr>
+          </a:p>
+        </p:txBody>
+      </p:sp>
+      <p:sp>
+        <p:nvSpPr>
+          <p:cNvPr id="3" name="Content Placeholder 2"/>
+          <p:cNvSpPr>
+            <a:spLocks noGrp="true"/>
+          </p:cNvSpPr>
+          <p:nvPr>
+            <p:ph idx="1"/>
+          </p:nvPr>
+        </p:nvSpPr>
+        <p:spPr>
+          <a:xfrm>
+            <a:off x="0" y="1440611"/>
+            <a:ext cx="12192000" cy="622293"/>
+          </a:xfrm>
+        </p:spPr>
+        <p:txBody>
+          <a:bodyPr/>
+          <a:lstStyle/>
+          <a:p>
+            <a:pPr marL="457200" lvl="1" indent="0">
+              <a:buNone/>
+            </a:pPr>
+            <a:r>
+              <a:rPr lang="en-US" altLang="en-US" sz="3200" b="1">
+                <a:latin typeface="Arial" panose="020B0604020202020204" pitchFamily="34" charset="0"/>
+                <a:cs typeface="Arial" panose="020B0604020202020204" pitchFamily="34" charset="0"/>
+              </a:rPr>
+              <a:t>3</a:t>
+            </a:r>
+            <a:r>
+              <a:rPr lang="en-US" sz="3200" b="1">
+                <a:latin typeface="Arial" panose="020B0604020202020204" pitchFamily="34" charset="0"/>
+                <a:cs typeface="Arial" panose="020B0604020202020204" pitchFamily="34" charset="0"/>
+              </a:rPr>
+              <a:t>. </a:t>
+            </a:r>
+            <a:r>
+              <a:rPr lang="en-US" altLang="en-US" sz="3200" b="1">
+                <a:latin typeface="Arial" panose="020B0604020202020204" pitchFamily="34" charset="0"/>
+                <a:cs typeface="Arial" panose="020B0604020202020204" pitchFamily="34" charset="0"/>
+              </a:rPr>
+              <a:t>Demo</a:t>
+            </a:r>
+            <a:endParaRPr lang="en-US" altLang="en-US" sz="3200" b="1">
+              <a:latin typeface="Arial" panose="020B0604020202020204" pitchFamily="34" charset="0"/>
+              <a:cs typeface="Arial" panose="020B0604020202020204" pitchFamily="34" charset="0"/>
+            </a:endParaRPr>
+          </a:p>
+        </p:txBody>
+      </p:sp>
+      <p:sp>
+        <p:nvSpPr>
+          <p:cNvPr id="7" name="Title 1"/>
+          <p:cNvSpPr txBox="true"/>
+          <p:nvPr/>
+        </p:nvSpPr>
+        <p:spPr>
+          <a:xfrm>
+            <a:off x="7467600" y="0"/>
+            <a:ext cx="4724400" cy="1167318"/>
+          </a:xfrm>
+          <a:prstGeom prst="rect">
+            <a:avLst/>
+          </a:prstGeom>
+          <a:solidFill>
+            <a:schemeClr val="tx1">
+              <a:lumMod val="95000"/>
+              <a:lumOff val="5000"/>
+            </a:schemeClr>
+          </a:solidFill>
+        </p:spPr>
+        <p:txBody>
+          <a:bodyPr vert="horz" lIns="91440" tIns="45720" rIns="91440" bIns="45720" rtlCol="0" anchor="ctr">
+            <a:normAutofit/>
+          </a:bodyPr>
+          <a:lstStyle>
+            <a:lvl1pPr algn="l" defTabSz="914400" rtl="0" eaLnBrk="1" latinLnBrk="0" hangingPunct="1">
+              <a:lnSpc>
+                <a:spcPct val="90000"/>
+              </a:lnSpc>
+              <a:spcBef>
+                <a:spcPct val="0"/>
+              </a:spcBef>
+              <a:buNone/>
+              <a:defRPr sz="4400" kern="1200">
+                <a:solidFill>
+                  <a:schemeClr val="tx1"/>
+                </a:solidFill>
+                <a:latin typeface="+mj-lt"/>
+                <a:ea typeface="+mj-ea"/>
+                <a:cs typeface="+mj-cs"/>
+              </a:defRPr>
+            </a:lvl1pPr>
+          </a:lstStyle>
+          <a:p>
+            <a:pPr marL="342900" indent="-342900">
+              <a:buAutoNum type="arabicPeriod"/>
+            </a:pPr>
+            <a:r>
+              <a:rPr lang="en-US" sz="1800" b="1">
+                <a:solidFill>
+                  <a:schemeClr val="bg2">
+                    <a:lumMod val="50000"/>
+                  </a:schemeClr>
+                </a:solidFill>
+                <a:latin typeface="Arial" panose="020B0604020202020204" pitchFamily="34" charset="0"/>
+                <a:cs typeface="Arial" panose="020B0604020202020204" pitchFamily="34" charset="0"/>
+              </a:rPr>
+              <a:t>Mô tả hệ thống</a:t>
+            </a:r>
+            <a:r>
+              <a:rPr lang="vi-VN" sz="1800" b="1">
+                <a:solidFill>
+                  <a:schemeClr val="bg2">
+                    <a:lumMod val="50000"/>
+                  </a:schemeClr>
+                </a:solidFill>
+                <a:latin typeface="Arial" panose="020B0604020202020204" pitchFamily="34" charset="0"/>
+                <a:cs typeface="Arial" panose="020B0604020202020204" pitchFamily="34" charset="0"/>
+              </a:rPr>
+              <a:t> </a:t>
+            </a:r>
+            <a:endParaRPr lang="en-US" sz="1800" b="1">
+              <a:solidFill>
+                <a:schemeClr val="bg2">
+                  <a:lumMod val="50000"/>
+                </a:schemeClr>
+              </a:solidFill>
+              <a:latin typeface="Arial" panose="020B0604020202020204" pitchFamily="34" charset="0"/>
+              <a:cs typeface="Arial" panose="020B0604020202020204" pitchFamily="34" charset="0"/>
+            </a:endParaRPr>
+          </a:p>
+          <a:p>
+            <a:pPr marL="342900" indent="-342900">
+              <a:buAutoNum type="arabicPeriod"/>
+            </a:pPr>
+            <a:r>
+              <a:rPr lang="en-US" sz="1800" b="1">
+                <a:solidFill>
+                  <a:schemeClr val="bg2">
+                    <a:lumMod val="50000"/>
+                  </a:schemeClr>
+                </a:solidFill>
+                <a:latin typeface="Arial" panose="020B0604020202020204" pitchFamily="34" charset="0"/>
+                <a:cs typeface="Arial" panose="020B0604020202020204" pitchFamily="34" charset="0"/>
+              </a:rPr>
+              <a:t>Công nghệ sử dụng</a:t>
+            </a:r>
+            <a:endParaRPr lang="en-US" sz="1800" b="1">
+              <a:solidFill>
+                <a:schemeClr val="bg2">
+                  <a:lumMod val="50000"/>
+                </a:schemeClr>
+              </a:solidFill>
+              <a:latin typeface="Arial" panose="020B0604020202020204" pitchFamily="34" charset="0"/>
+              <a:cs typeface="Arial" panose="020B0604020202020204" pitchFamily="34" charset="0"/>
+            </a:endParaRPr>
+          </a:p>
+          <a:p>
+            <a:pPr marL="342900" indent="-342900">
+              <a:buAutoNum type="arabicPeriod"/>
+            </a:pPr>
+            <a:r>
+              <a:rPr lang="en-US" altLang="en-US" sz="1800" b="1">
+                <a:solidFill>
+                  <a:schemeClr val="bg1"/>
+                </a:solidFill>
+                <a:latin typeface="Arial" panose="020B0604020202020204" pitchFamily="34" charset="0"/>
+                <a:cs typeface="Arial" panose="020B0604020202020204" pitchFamily="34" charset="0"/>
+              </a:rPr>
+              <a:t>Demo</a:t>
+            </a:r>
+            <a:endParaRPr lang="en-US" altLang="en-US" sz="1800" b="1">
+              <a:solidFill>
+                <a:schemeClr val="bg1"/>
+              </a:solidFill>
+              <a:latin typeface="Arial" panose="020B0604020202020204" pitchFamily="34" charset="0"/>
+              <a:cs typeface="Arial" panose="020B0604020202020204" pitchFamily="34" charset="0"/>
+            </a:endParaRPr>
+          </a:p>
+        </p:txBody>
+      </p:sp>
+      <p:sp>
+        <p:nvSpPr>
+          <p:cNvPr id="8" name="Content Placeholder 2"/>
+          <p:cNvSpPr txBox="true"/>
+          <p:nvPr/>
+        </p:nvSpPr>
+        <p:spPr>
+          <a:xfrm>
+            <a:off x="0" y="2395643"/>
+            <a:ext cx="12192000" cy="3810604"/>
+          </a:xfrm>
+          <a:prstGeom prst="rect">
+            <a:avLst/>
+          </a:prstGeom>
+        </p:spPr>
+        <p:txBody>
+          <a:bodyPr vert="horz" lIns="91440" tIns="45720" rIns="91440" bIns="45720" rtlCol="0">
+            <a:noAutofit/>
+          </a:bodyPr>
+          <a:lstStyle>
+            <a:lvl1pPr marL="228600" indent="-228600" algn="l" defTabSz="914400" rtl="0" eaLnBrk="1" latinLnBrk="0" hangingPunct="1">
+              <a:lnSpc>
+                <a:spcPct val="90000"/>
+              </a:lnSpc>
+              <a:spcBef>
+                <a:spcPts val="1000"/>
+              </a:spcBef>
+              <a:buFont typeface="Arial" panose="020B0604020202020204" pitchFamily="34" charset="0"/>
+              <a:buChar char="•"/>
+              <a:defRPr sz="2800" kern="1200">
+                <a:solidFill>
+                  <a:schemeClr val="tx1"/>
+                </a:solidFill>
+                <a:latin typeface="+mn-lt"/>
+                <a:ea typeface="+mn-ea"/>
+                <a:cs typeface="+mn-cs"/>
+              </a:defRPr>
+            </a:lvl1pPr>
+            <a:lvl2pPr marL="685800" indent="-228600" algn="l" defTabSz="914400" rtl="0" eaLnBrk="1" latinLnBrk="0" hangingPunct="1">
+              <a:lnSpc>
+                <a:spcPct val="90000"/>
+              </a:lnSpc>
+              <a:spcBef>
+                <a:spcPts val="500"/>
+              </a:spcBef>
+              <a:buFont typeface="Arial" panose="020B0604020202020204" pitchFamily="34" charset="0"/>
+              <a:buChar char="•"/>
+              <a:defRPr sz="2400" kern="1200">
+                <a:solidFill>
+                  <a:schemeClr val="tx1"/>
+                </a:solidFill>
+                <a:latin typeface="+mn-lt"/>
+                <a:ea typeface="+mn-ea"/>
+                <a:cs typeface="+mn-cs"/>
+              </a:defRPr>
+            </a:lvl2pPr>
+            <a:lvl3pPr marL="1143000" indent="-228600" algn="l" defTabSz="914400" rtl="0" eaLnBrk="1" latinLnBrk="0" hangingPunct="1">
+              <a:lnSpc>
+                <a:spcPct val="90000"/>
+              </a:lnSpc>
+              <a:spcBef>
+                <a:spcPts val="500"/>
+              </a:spcBef>
+              <a:buFont typeface="Arial" panose="020B0604020202020204" pitchFamily="34" charset="0"/>
+              <a:buChar char="•"/>
+              <a:defRPr sz="2000" kern="1200">
+                <a:solidFill>
+                  <a:schemeClr val="tx1"/>
+                </a:solidFill>
+                <a:latin typeface="+mn-lt"/>
+                <a:ea typeface="+mn-ea"/>
+                <a:cs typeface="+mn-cs"/>
+              </a:defRPr>
+            </a:lvl3pPr>
+            <a:lvl4pPr marL="1600200" indent="-228600" algn="l" defTabSz="914400" rtl="0" eaLnBrk="1" latinLnBrk="0" hangingPunct="1">
+              <a:lnSpc>
+                <a:spcPct val="90000"/>
+              </a:lnSpc>
+              <a:spcBef>
+                <a:spcPts val="500"/>
+              </a:spcBef>
+              <a:buFont typeface="Arial" panose="020B0604020202020204" pitchFamily="34" charset="0"/>
+              <a:buChar char="•"/>
+              <a:defRPr sz="1800" kern="1200">
+                <a:solidFill>
+                  <a:schemeClr val="tx1"/>
+                </a:solidFill>
+                <a:latin typeface="+mn-lt"/>
+                <a:ea typeface="+mn-ea"/>
+                <a:cs typeface="+mn-cs"/>
+              </a:defRPr>
+            </a:lvl4pPr>
+            <a:lvl5pPr marL="2057400" indent="-228600" algn="l" defTabSz="914400" rtl="0" eaLnBrk="1" latinLnBrk="0" hangingPunct="1">
+              <a:lnSpc>
+                <a:spcPct val="90000"/>
+              </a:lnSpc>
+              <a:spcBef>
+                <a:spcPts val="500"/>
+              </a:spcBef>
+              <a:buFont typeface="Arial" panose="020B0604020202020204" pitchFamily="34" charset="0"/>
+              <a:buChar char="•"/>
+              <a:defRPr sz="1800" kern="1200">
+                <a:solidFill>
+                  <a:schemeClr val="tx1"/>
+                </a:solidFill>
+                <a:latin typeface="+mn-lt"/>
+                <a:ea typeface="+mn-ea"/>
+                <a:cs typeface="+mn-cs"/>
+              </a:defRPr>
+            </a:lvl5pPr>
+            <a:lvl6pPr marL="2514600" indent="-228600" algn="l" defTabSz="914400" rtl="0" eaLnBrk="1" latinLnBrk="0" hangingPunct="1">
+              <a:lnSpc>
+                <a:spcPct val="90000"/>
+              </a:lnSpc>
+              <a:spcBef>
+                <a:spcPts val="500"/>
+              </a:spcBef>
+              <a:buFont typeface="Arial" panose="020B0604020202020204" pitchFamily="34" charset="0"/>
+              <a:buChar char="•"/>
+              <a:defRPr sz="1800" kern="1200">
+                <a:solidFill>
+                  <a:schemeClr val="tx1"/>
+                </a:solidFill>
+                <a:latin typeface="+mn-lt"/>
+                <a:ea typeface="+mn-ea"/>
+                <a:cs typeface="+mn-cs"/>
+              </a:defRPr>
+            </a:lvl6pPr>
+            <a:lvl7pPr marL="2971800" indent="-228600" algn="l" defTabSz="914400" rtl="0" eaLnBrk="1" latinLnBrk="0" hangingPunct="1">
+              <a:lnSpc>
+                <a:spcPct val="90000"/>
+              </a:lnSpc>
+              <a:spcBef>
+                <a:spcPts val="500"/>
+              </a:spcBef>
+              <a:buFont typeface="Arial" panose="020B0604020202020204" pitchFamily="34" charset="0"/>
+              <a:buChar char="•"/>
+              <a:defRPr sz="1800" kern="1200">
+                <a:solidFill>
+                  <a:schemeClr val="tx1"/>
+                </a:solidFill>
+                <a:latin typeface="+mn-lt"/>
+                <a:ea typeface="+mn-ea"/>
+                <a:cs typeface="+mn-cs"/>
+              </a:defRPr>
+            </a:lvl7pPr>
+            <a:lvl8pPr marL="3429000" indent="-228600" algn="l" defTabSz="914400" rtl="0" eaLnBrk="1" latinLnBrk="0" hangingPunct="1">
+              <a:lnSpc>
+                <a:spcPct val="90000"/>
+              </a:lnSpc>
+              <a:spcBef>
+                <a:spcPts val="500"/>
+              </a:spcBef>
+              <a:buFont typeface="Arial" panose="020B0604020202020204" pitchFamily="34" charset="0"/>
+              <a:buChar char="•"/>
+              <a:defRPr sz="1800" kern="1200">
+                <a:solidFill>
+                  <a:schemeClr val="tx1"/>
+                </a:solidFill>
+                <a:latin typeface="+mn-lt"/>
+                <a:ea typeface="+mn-ea"/>
+                <a:cs typeface="+mn-cs"/>
+              </a:defRPr>
+            </a:lvl8pPr>
+            <a:lvl9pPr marL="3886200" indent="-228600" algn="l" defTabSz="914400" rtl="0" eaLnBrk="1" latinLnBrk="0" hangingPunct="1">
+              <a:lnSpc>
+                <a:spcPct val="90000"/>
+              </a:lnSpc>
+              <a:spcBef>
+                <a:spcPts val="500"/>
+              </a:spcBef>
+              <a:buFont typeface="Arial" panose="020B0604020202020204" pitchFamily="34" charset="0"/>
+              <a:buChar char="•"/>
+              <a:defRPr sz="1800" kern="1200">
+                <a:solidFill>
+                  <a:schemeClr val="tx1"/>
+                </a:solidFill>
+                <a:latin typeface="+mn-lt"/>
+                <a:ea typeface="+mn-ea"/>
+                <a:cs typeface="+mn-cs"/>
+              </a:defRPr>
+            </a:lvl9pPr>
+          </a:lstStyle>
+          <a:p>
+            <a:pPr marL="0" indent="0" algn="just">
+              <a:lnSpc>
+                <a:spcPct val="200000"/>
+              </a:lnSpc>
+              <a:buFont typeface="Arial" panose="020B0604020202020204" pitchFamily="34" charset="0"/>
+              <a:buNone/>
+            </a:pPr>
+            <a:r>
+              <a:rPr lang="en-US" sz="3000"/>
+              <a:t>	</a:t>
+            </a:r>
+            <a:endParaRPr lang="en-US" sz="3000">
+              <a:latin typeface="Arial" panose="020B0604020202020204" pitchFamily="34" charset="0"/>
+              <a:cs typeface="Arial" panose="020B0604020202020204" pitchFamily="34" charset="0"/>
+            </a:endParaRPr>
+          </a:p>
+        </p:txBody>
+      </p:sp>
+      <p:sp>
+        <p:nvSpPr>
+          <p:cNvPr id="4" name="Slide Number Placeholder 3"/>
+          <p:cNvSpPr>
+            <a:spLocks noGrp="true"/>
+          </p:cNvSpPr>
+          <p:nvPr>
+            <p:ph type="sldNum" sz="quarter" idx="12"/>
+          </p:nvPr>
+        </p:nvSpPr>
+        <p:spPr/>
+        <p:txBody>
+          <a:bodyPr/>
+          <a:lstStyle/>
+          <a:p>
+            <a:fld id="{1F57CBCC-0EFC-4EA7-A71B-8F9B02880562}" type="slidenum">
+              <a:rPr lang="en-US" sz="1400" smtClean="0">
+                <a:latin typeface="Arial (Body)"/>
+              </a:rPr>
+            </a:fld>
+            <a:endParaRPr lang="en-US" sz="1400">
+              <a:latin typeface="Arial (Body)"/>
+            </a:endParaRPr>
+          </a:p>
+        </p:txBody>
+      </p:sp>
+      <p:pic>
+        <p:nvPicPr>
+          <p:cNvPr id="6" name="Picture 5"/>
+          <p:cNvPicPr>
+            <a:picLocks noChangeAspect="true"/>
+          </p:cNvPicPr>
+          <p:nvPr/>
+        </p:nvPicPr>
+        <p:blipFill>
+          <a:blip r:embed="rId1"/>
+          <a:stretch>
+            <a:fillRect/>
+          </a:stretch>
+        </p:blipFill>
+        <p:spPr>
+          <a:xfrm>
+            <a:off x="3269615" y="2510790"/>
+            <a:ext cx="5652770" cy="2644775"/>
+          </a:xfrm>
+          <a:prstGeom prst="rect">
+            <a:avLst/>
+          </a:prstGeom>
+        </p:spPr>
+      </p:pic>
+    </p:spTree>
+  </p:cSld>
+  <p:clrMapOvr>
+    <a:masterClrMapping/>
+  </p:clrMapOvr>
+</p:sld>
+</file>
+
+<file path=ppt/slides/slide11.xml><?xml version="1.0" encoding="utf-8"?>
 <p:sld xmlns:a="http://schemas.openxmlformats.org/drawingml/2006/main" xmlns:r="http://schemas.openxmlformats.org/officeDocument/2006/relationships" xmlns:p="http://schemas.openxmlformats.org/presentationml/2006/main">
   <p:cSld>
     <p:spTree>
@@ -7839,13 +8307,7 @@
               <a:rPr lang="en-US" sz="4400" b="1">
                 <a:latin typeface="Arial (Body)"/>
               </a:rPr>
-              <a:t> </a:t>
-            </a:r>
-            <a:r>
-              <a:rPr lang="en-US" sz="4400" b="1" smtClean="0">
-                <a:latin typeface="Arial (Body)"/>
-              </a:rPr>
-              <a:t>dõi !</a:t>
+              <a:t> dõi !</a:t>
             </a:r>
             <a:endParaRPr lang="en-US" sz="5400" b="1">
               <a:latin typeface="Arial (Body)"/>
@@ -7859,13 +8321,6 @@
   <p:clrMapOvr>
     <a:masterClrMapping/>
   </p:clrMapOvr>
-  <p:timing>
-    <p:tnLst>
-      <p:par>
-        <p:cTn id="1" dur="indefinite" restart="never" nodeType="tmRoot"/>
-      </p:par>
-    </p:tnLst>
-  </p:timing>
 </p:sld>
 </file>
 
@@ -7968,13 +8423,13 @@
               <a:t>1. </a:t>
             </a:r>
             <a:r>
-              <a:rPr lang="en-US" altLang="en-US" sz="3200" smtClean="0">
+              <a:rPr lang="en-US" altLang="en-US" sz="3200">
                 <a:latin typeface="Arial" panose="020B0604020202020204" pitchFamily="34" charset="0"/>
                 <a:cs typeface="Arial" panose="020B0604020202020204" pitchFamily="34" charset="0"/>
               </a:rPr>
               <a:t>Mô tả hệ thống</a:t>
             </a:r>
-            <a:endParaRPr lang="en-US" altLang="en-US" sz="3200" smtClean="0">
+            <a:endParaRPr lang="en-US" altLang="en-US" sz="3200">
               <a:latin typeface="Arial" panose="020B0604020202020204" pitchFamily="34" charset="0"/>
               <a:cs typeface="Arial" panose="020B0604020202020204" pitchFamily="34" charset="0"/>
             </a:endParaRPr>
@@ -8436,13 +8891,6 @@
   <p:clrMapOvr>
     <a:masterClrMapping/>
   </p:clrMapOvr>
-  <p:timing>
-    <p:tnLst>
-      <p:par>
-        <p:cTn id="1" dur="indefinite" restart="never" nodeType="tmRoot"/>
-      </p:par>
-    </p:tnLst>
-  </p:timing>
 </p:sld>
 </file>
 
@@ -8494,24 +8942,14 @@
               </a:lnSpc>
             </a:pPr>
             <a:r>
-              <a:rPr lang="en-US" sz="3200" b="1" smtClean="0">
+              <a:rPr lang="en-US" sz="3200" b="1">
                 <a:solidFill>
                   <a:schemeClr val="bg1"/>
                 </a:solidFill>
                 <a:latin typeface="Arial" panose="020B0604020202020204" pitchFamily="34" charset="0"/>
                 <a:cs typeface="Arial" panose="020B0604020202020204" pitchFamily="34" charset="0"/>
               </a:rPr>
-              <a:t>HỆ </a:t>
-            </a:r>
-            <a:r>
-              <a:rPr lang="en-US" sz="3200" b="1">
-                <a:solidFill>
-                  <a:schemeClr val="bg1"/>
-                </a:solidFill>
-                <a:latin typeface="Arial" panose="020B0604020202020204" pitchFamily="34" charset="0"/>
-                <a:cs typeface="Arial" panose="020B0604020202020204" pitchFamily="34" charset="0"/>
-              </a:rPr>
-              <a:t>THỐNG</a:t>
+              <a:t>HỆ THỐNG</a:t>
             </a:r>
             <a:r>
               <a:rPr lang="en-US" altLang="en-US" sz="3200" b="1">
@@ -8557,18 +8995,11 @@
               <a:buNone/>
             </a:pPr>
             <a:r>
-              <a:rPr lang="en-US" sz="3200" b="1" smtClean="0">
-                <a:latin typeface="Arial" panose="020B0604020202020204" pitchFamily="34" charset="0"/>
-                <a:cs typeface="Arial" panose="020B0604020202020204" pitchFamily="34" charset="0"/>
-              </a:rPr>
-              <a:t>1</a:t>
-            </a:r>
-            <a:r>
               <a:rPr lang="en-US" sz="3200" b="1">
                 <a:latin typeface="Arial" panose="020B0604020202020204" pitchFamily="34" charset="0"/>
                 <a:cs typeface="Arial" panose="020B0604020202020204" pitchFamily="34" charset="0"/>
               </a:rPr>
-              <a:t>. </a:t>
+              <a:t>1. </a:t>
             </a:r>
             <a:r>
               <a:rPr lang="en-US" altLang="en-US" sz="3200" b="1">
@@ -9136,48 +9567,27 @@
               <a:buChar char="-"/>
             </a:pPr>
             <a:r>
-              <a:rPr lang="en-US" altLang="en-US" sz="2400" smtClean="0">
+              <a:rPr lang="en-US" altLang="en-US" sz="2400">
                 <a:latin typeface="Arial" panose="020B0604020202020204" pitchFamily="34" charset="0"/>
                 <a:cs typeface="Arial" panose="020B0604020202020204" pitchFamily="34" charset="0"/>
               </a:rPr>
-              <a:t>Hệ thống quản lý khu trọ quận Cái Răng là một hệ thống thông tin địa lý</a:t>
-            </a:r>
-            <a:r>
-              <a:rPr lang="" altLang="en-US" sz="2400" smtClean="0">
+              <a:t>Hệ thống quản lý khu trọ quận Cái Răng là một hệ thống thông tin địa lý </a:t>
+            </a:r>
+            <a:r>
+              <a:rPr lang="en-US" sz="2400">
                 <a:latin typeface="Arial" panose="020B0604020202020204" pitchFamily="34" charset="0"/>
                 <a:cs typeface="Arial" panose="020B0604020202020204" pitchFamily="34" charset="0"/>
               </a:rPr>
-              <a:t> </a:t>
-            </a:r>
-            <a:r>
-              <a:rPr lang="" sz="2400" smtClean="0">
+              <a:t>gồm</a:t>
+            </a:r>
+            <a:r>
+              <a:rPr lang="en-US" altLang="en-US" sz="2400">
                 <a:latin typeface="Arial" panose="020B0604020202020204" pitchFamily="34" charset="0"/>
                 <a:cs typeface="Arial" panose="020B0604020202020204" pitchFamily="34" charset="0"/>
               </a:rPr>
-              <a:t>gồm</a:t>
-            </a:r>
-            <a:r>
-              <a:rPr lang="en-US" altLang="en-US" sz="2400" smtClean="0">
-                <a:latin typeface="Arial" panose="020B0604020202020204" pitchFamily="34" charset="0"/>
-                <a:cs typeface="Arial" panose="020B0604020202020204" pitchFamily="34" charset="0"/>
-              </a:rPr>
-              <a:t> các chứ năng</a:t>
-            </a:r>
-            <a:r>
-              <a:rPr lang="" altLang="en-US" sz="2400" smtClean="0">
-                <a:latin typeface="Arial" panose="020B0604020202020204" pitchFamily="34" charset="0"/>
-                <a:cs typeface="Arial" panose="020B0604020202020204" pitchFamily="34" charset="0"/>
-              </a:rPr>
-              <a:t> </a:t>
-            </a:r>
-            <a:r>
-              <a:rPr lang="en-US" altLang="en-US" sz="2400" smtClean="0">
-                <a:latin typeface="Arial" panose="020B0604020202020204" pitchFamily="34" charset="0"/>
-                <a:cs typeface="Arial" panose="020B0604020202020204" pitchFamily="34" charset="0"/>
-              </a:rPr>
-              <a:t>phục vụ quản lý thông tin các khu trọ trên địa bàn quận Cái Răng, Thành Phố Cần Thơ.</a:t>
-            </a:r>
-            <a:endParaRPr lang="en-US" altLang="en-US" sz="2400" smtClean="0">
+              <a:t> các chức năng phục vụ quản lý thông tin các khu trọ trên địa bàn quận Cái Răng, Thành Phố Cần Thơ.</a:t>
+            </a:r>
+            <a:endParaRPr lang="en-US" altLang="en-US" sz="2400">
               <a:latin typeface="Arial" panose="020B0604020202020204" pitchFamily="34" charset="0"/>
               <a:cs typeface="Arial" panose="020B0604020202020204" pitchFamily="34" charset="0"/>
             </a:endParaRPr>
@@ -9197,13 +9607,13 @@
               <a:buChar char="-"/>
             </a:pPr>
             <a:r>
-              <a:rPr lang="en-US" altLang="en-US" sz="2400" smtClean="0">
+              <a:rPr lang="en-US" altLang="en-US" sz="2400">
                 <a:latin typeface="Arial" panose="020B0604020202020204" pitchFamily="34" charset="0"/>
                 <a:cs typeface="Arial" panose="020B0604020202020204" pitchFamily="34" charset="0"/>
               </a:rPr>
               <a:t>Các chức năng đã xây dựng gồm 4 phân hệ: Bản đồ, khu trọ, loại phòng, tài khoản.</a:t>
             </a:r>
-            <a:endParaRPr lang="en-US" altLang="en-US" sz="2400" smtClean="0">
+            <a:endParaRPr lang="en-US" altLang="en-US" sz="2400">
               <a:latin typeface="Arial" panose="020B0604020202020204" pitchFamily="34" charset="0"/>
               <a:cs typeface="Arial" panose="020B0604020202020204" pitchFamily="34" charset="0"/>
             </a:endParaRPr>
@@ -9215,13 +9625,6 @@
   <p:clrMapOvr>
     <a:masterClrMapping/>
   </p:clrMapOvr>
-  <p:timing>
-    <p:tnLst>
-      <p:par>
-        <p:cTn id="1" dur="indefinite" restart="never" nodeType="tmRoot"/>
-      </p:par>
-    </p:tnLst>
-  </p:timing>
 </p:sld>
 </file>
 
@@ -9273,24 +9676,14 @@
               </a:lnSpc>
             </a:pPr>
             <a:r>
-              <a:rPr lang="en-US" sz="3200" b="1" smtClean="0">
+              <a:rPr lang="en-US" sz="3200" b="1">
                 <a:solidFill>
                   <a:schemeClr val="bg1"/>
                 </a:solidFill>
                 <a:latin typeface="Arial" panose="020B0604020202020204" pitchFamily="34" charset="0"/>
                 <a:cs typeface="Arial" panose="020B0604020202020204" pitchFamily="34" charset="0"/>
               </a:rPr>
-              <a:t>HỆ </a:t>
-            </a:r>
-            <a:r>
-              <a:rPr lang="en-US" sz="3200" b="1">
-                <a:solidFill>
-                  <a:schemeClr val="bg1"/>
-                </a:solidFill>
-                <a:latin typeface="Arial" panose="020B0604020202020204" pitchFamily="34" charset="0"/>
-                <a:cs typeface="Arial" panose="020B0604020202020204" pitchFamily="34" charset="0"/>
-              </a:rPr>
-              <a:t>THỐNG</a:t>
+              <a:t>HỆ THỐNG</a:t>
             </a:r>
             <a:r>
               <a:rPr lang="en-US" altLang="en-US" sz="3200" b="1">
@@ -9336,18 +9729,11 @@
               <a:buNone/>
             </a:pPr>
             <a:r>
-              <a:rPr lang="en-US" sz="3200" b="1" smtClean="0">
-                <a:latin typeface="Arial" panose="020B0604020202020204" pitchFamily="34" charset="0"/>
-                <a:cs typeface="Arial" panose="020B0604020202020204" pitchFamily="34" charset="0"/>
-              </a:rPr>
-              <a:t>1</a:t>
-            </a:r>
-            <a:r>
               <a:rPr lang="en-US" sz="3200" b="1">
                 <a:latin typeface="Arial" panose="020B0604020202020204" pitchFamily="34" charset="0"/>
                 <a:cs typeface="Arial" panose="020B0604020202020204" pitchFamily="34" charset="0"/>
               </a:rPr>
-              <a:t>. </a:t>
+              <a:t>1. </a:t>
             </a:r>
             <a:r>
               <a:rPr lang="en-US" altLang="en-US" sz="3200" b="1">
@@ -9726,7 +10112,7 @@
         <p:spPr>
           <a:xfrm>
             <a:off x="443865" y="2111375"/>
-            <a:ext cx="5151120" cy="4095115"/>
+            <a:ext cx="4973320" cy="4095115"/>
           </a:xfrm>
           <a:prstGeom prst="rect">
             <a:avLst/>
@@ -9915,20 +10301,13 @@
               <a:buNone/>
             </a:pPr>
             <a:r>
-              <a:rPr lang="" altLang="en-US" sz="2400" b="1" smtClean="0">
+              <a:rPr lang="en-US" altLang="en-US" sz="2400" b="1">
                 <a:latin typeface="Arial" panose="020B0604020202020204" pitchFamily="34" charset="0"/>
                 <a:cs typeface="Arial" panose="020B0604020202020204" pitchFamily="34" charset="0"/>
               </a:rPr>
-              <a:t> </a:t>
-            </a:r>
-            <a:r>
-              <a:rPr lang="en-US" altLang="en-US" sz="2400" b="1" smtClean="0">
-                <a:latin typeface="Arial" panose="020B0604020202020204" pitchFamily="34" charset="0"/>
-                <a:cs typeface="Arial" panose="020B0604020202020204" pitchFamily="34" charset="0"/>
-              </a:rPr>
-              <a:t>Phân hệ bản đồ:</a:t>
-            </a:r>
-            <a:endParaRPr lang="en-US" altLang="en-US" sz="2400" smtClean="0">
+              <a:t> Phân hệ bản đồ:</a:t>
+            </a:r>
+            <a:endParaRPr lang="en-US" altLang="en-US" sz="2400">
               <a:latin typeface="Arial" panose="020B0604020202020204" pitchFamily="34" charset="0"/>
               <a:cs typeface="Arial" panose="020B0604020202020204" pitchFamily="34" charset="0"/>
             </a:endParaRPr>
@@ -9948,13 +10327,13 @@
               <a:buChar char="•"/>
             </a:pPr>
             <a:r>
-              <a:rPr lang="en-US" altLang="en-US" sz="2000" smtClean="0">
+              <a:rPr lang="en-US" altLang="en-US" sz="2000">
                 <a:latin typeface="Arial" panose="020B0604020202020204" pitchFamily="34" charset="0"/>
                 <a:cs typeface="Arial" panose="020B0604020202020204" pitchFamily="34" charset="0"/>
               </a:rPr>
               <a:t>Thống kê mật độ khu trọ theo phường</a:t>
             </a:r>
-            <a:endParaRPr lang="en-US" altLang="en-US" sz="2000" smtClean="0">
+            <a:endParaRPr lang="en-US" altLang="en-US" sz="2000">
               <a:latin typeface="Arial" panose="020B0604020202020204" pitchFamily="34" charset="0"/>
               <a:cs typeface="Arial" panose="020B0604020202020204" pitchFamily="34" charset="0"/>
             </a:endParaRPr>
@@ -9974,13 +10353,13 @@
               <a:buChar char="•"/>
             </a:pPr>
             <a:r>
-              <a:rPr lang="en-US" altLang="en-US" sz="2000" smtClean="0">
+              <a:rPr lang="en-US" altLang="en-US" sz="2000">
                 <a:latin typeface="Arial" panose="020B0604020202020204" pitchFamily="34" charset="0"/>
                 <a:cs typeface="Arial" panose="020B0604020202020204" pitchFamily="34" charset="0"/>
               </a:rPr>
               <a:t> Hiển thị bản đồ khu trọ, trường học</a:t>
             </a:r>
-            <a:endParaRPr lang="en-US" altLang="en-US" sz="2000" smtClean="0">
+            <a:endParaRPr lang="en-US" altLang="en-US" sz="2000">
               <a:latin typeface="Arial" panose="020B0604020202020204" pitchFamily="34" charset="0"/>
               <a:cs typeface="Arial" panose="020B0604020202020204" pitchFamily="34" charset="0"/>
             </a:endParaRPr>
@@ -10000,13 +10379,27 @@
               <a:buChar char="•"/>
             </a:pPr>
             <a:r>
-              <a:rPr lang="en-US" altLang="en-US" sz="2000" smtClean="0">
+              <a:rPr lang="en-US" altLang="en-US" sz="2000">
                 <a:latin typeface="Arial" panose="020B0604020202020204" pitchFamily="34" charset="0"/>
                 <a:cs typeface="Arial" panose="020B0604020202020204" pitchFamily="34" charset="0"/>
               </a:rPr>
-              <a:t>Tìm kiếm khu trọ theo tên trọ hoặc tên chủ trọ</a:t>
-            </a:r>
-            <a:endParaRPr lang="en-US" altLang="en-US" sz="2000" smtClean="0">
+              <a:t>Tìm kiếm khu trọ theo tên</a:t>
+            </a:r>
+            <a:r>
+              <a:rPr lang="" altLang="en-US" sz="2000">
+                <a:latin typeface="Arial" panose="020B0604020202020204" pitchFamily="34" charset="0"/>
+                <a:cs typeface="Arial" panose="020B0604020202020204" pitchFamily="34" charset="0"/>
+              </a:rPr>
+              <a:t> khu</a:t>
+            </a:r>
+            <a:r>
+              <a:rPr lang="en-US" altLang="en-US" sz="2000">
+                <a:latin typeface="Arial" panose="020B0604020202020204" pitchFamily="34" charset="0"/>
+                <a:cs typeface="Arial" panose="020B0604020202020204" pitchFamily="34" charset="0"/>
+              </a:rPr>
+              <a:t> trọ hoặc tên chủ trọ</a:t>
+            </a:r>
+            <a:endParaRPr lang="en-US" altLang="en-US" sz="2000">
               <a:latin typeface="Arial" panose="020B0604020202020204" pitchFamily="34" charset="0"/>
               <a:cs typeface="Arial" panose="020B0604020202020204" pitchFamily="34" charset="0"/>
             </a:endParaRPr>
@@ -10026,13 +10419,13 @@
               <a:buChar char="•"/>
             </a:pPr>
             <a:r>
-              <a:rPr lang="en-US" altLang="en-US" sz="2000" smtClean="0">
+              <a:rPr lang="en-US" altLang="en-US" sz="2000">
                 <a:latin typeface="Arial" panose="020B0604020202020204" pitchFamily="34" charset="0"/>
                 <a:cs typeface="Arial" panose="020B0604020202020204" pitchFamily="34" charset="0"/>
               </a:rPr>
               <a:t>Tìm đường đi từ vị trí hiện tại đến khu trọ đã tìm</a:t>
             </a:r>
-            <a:endParaRPr lang="en-US" altLang="en-US" sz="2000" smtClean="0">
+            <a:endParaRPr lang="en-US" altLang="en-US" sz="2000">
               <a:latin typeface="Arial" panose="020B0604020202020204" pitchFamily="34" charset="0"/>
               <a:cs typeface="Arial" panose="020B0604020202020204" pitchFamily="34" charset="0"/>
             </a:endParaRPr>
@@ -10074,13 +10467,6 @@
   <p:clrMapOvr>
     <a:masterClrMapping/>
   </p:clrMapOvr>
-  <p:timing>
-    <p:tnLst>
-      <p:par>
-        <p:cTn id="1" dur="indefinite" restart="never" nodeType="tmRoot"/>
-      </p:par>
-    </p:tnLst>
-  </p:timing>
 </p:sld>
 </file>
 
@@ -10132,24 +10518,14 @@
               </a:lnSpc>
             </a:pPr>
             <a:r>
-              <a:rPr lang="en-US" sz="3200" b="1" smtClean="0">
+              <a:rPr lang="en-US" sz="3200" b="1">
                 <a:solidFill>
                   <a:schemeClr val="bg1"/>
                 </a:solidFill>
                 <a:latin typeface="Arial" panose="020B0604020202020204" pitchFamily="34" charset="0"/>
                 <a:cs typeface="Arial" panose="020B0604020202020204" pitchFamily="34" charset="0"/>
               </a:rPr>
-              <a:t>HỆ </a:t>
-            </a:r>
-            <a:r>
-              <a:rPr lang="en-US" sz="3200" b="1">
-                <a:solidFill>
-                  <a:schemeClr val="bg1"/>
-                </a:solidFill>
-                <a:latin typeface="Arial" panose="020B0604020202020204" pitchFamily="34" charset="0"/>
-                <a:cs typeface="Arial" panose="020B0604020202020204" pitchFamily="34" charset="0"/>
-              </a:rPr>
-              <a:t>THỐNG</a:t>
+              <a:t>HỆ THỐNG</a:t>
             </a:r>
             <a:r>
               <a:rPr lang="en-US" altLang="en-US" sz="3200" b="1">
@@ -10195,18 +10571,11 @@
               <a:buNone/>
             </a:pPr>
             <a:r>
-              <a:rPr lang="en-US" sz="3200" b="1" smtClean="0">
-                <a:latin typeface="Arial" panose="020B0604020202020204" pitchFamily="34" charset="0"/>
-                <a:cs typeface="Arial" panose="020B0604020202020204" pitchFamily="34" charset="0"/>
-              </a:rPr>
-              <a:t>1</a:t>
-            </a:r>
-            <a:r>
               <a:rPr lang="en-US" sz="3200" b="1">
                 <a:latin typeface="Arial" panose="020B0604020202020204" pitchFamily="34" charset="0"/>
                 <a:cs typeface="Arial" panose="020B0604020202020204" pitchFamily="34" charset="0"/>
               </a:rPr>
-              <a:t>. </a:t>
+              <a:t>1. </a:t>
             </a:r>
             <a:r>
               <a:rPr lang="en-US" altLang="en-US" sz="3200" b="1">
@@ -10774,20 +11143,20 @@
               <a:buNone/>
             </a:pPr>
             <a:r>
-              <a:rPr lang="" altLang="en-US" sz="2400" smtClean="0">
+              <a:rPr lang="en-US" altLang="en-US" sz="2400">
                 <a:latin typeface="Arial" panose="020B0604020202020204" pitchFamily="34" charset="0"/>
                 <a:cs typeface="Arial" panose="020B0604020202020204" pitchFamily="34" charset="0"/>
               </a:rPr>
               <a:t> </a:t>
             </a:r>
             <a:r>
-              <a:rPr lang="en-US" altLang="en-US" sz="2400" b="1" smtClean="0">
+              <a:rPr lang="en-US" altLang="en-US" sz="2400" b="1">
                 <a:latin typeface="Arial" panose="020B0604020202020204" pitchFamily="34" charset="0"/>
                 <a:cs typeface="Arial" panose="020B0604020202020204" pitchFamily="34" charset="0"/>
               </a:rPr>
               <a:t>Phân hệ khu trọ:</a:t>
             </a:r>
-            <a:endParaRPr lang="en-US" altLang="en-US" sz="2400" b="1" smtClean="0">
+            <a:endParaRPr lang="en-US" altLang="en-US" sz="2400" b="1">
               <a:latin typeface="Arial" panose="020B0604020202020204" pitchFamily="34" charset="0"/>
               <a:cs typeface="Arial" panose="020B0604020202020204" pitchFamily="34" charset="0"/>
             </a:endParaRPr>
@@ -10807,13 +11176,13 @@
               <a:buChar char="•"/>
             </a:pPr>
             <a:r>
-              <a:rPr lang="en-US" altLang="en-US" sz="2000" smtClean="0">
+              <a:rPr lang="en-US" altLang="en-US" sz="2000">
                 <a:latin typeface="Arial" panose="020B0604020202020204" pitchFamily="34" charset="0"/>
                 <a:cs typeface="Arial" panose="020B0604020202020204" pitchFamily="34" charset="0"/>
               </a:rPr>
               <a:t>Hiển thị danh sách khu trọ hiện có, cập nhật thông tin khu trọ, thêm khu trọ mới</a:t>
             </a:r>
-            <a:endParaRPr lang="en-US" altLang="en-US" sz="2000" smtClean="0">
+            <a:endParaRPr lang="en-US" altLang="en-US" sz="2000">
               <a:latin typeface="Arial" panose="020B0604020202020204" pitchFamily="34" charset="0"/>
               <a:cs typeface="Arial" panose="020B0604020202020204" pitchFamily="34" charset="0"/>
             </a:endParaRPr>
@@ -10833,13 +11202,13 @@
               <a:buChar char="•"/>
             </a:pPr>
             <a:r>
-              <a:rPr lang="en-US" altLang="en-US" sz="2000" smtClean="0">
+              <a:rPr lang="en-US" altLang="en-US" sz="2000">
                 <a:latin typeface="Arial" panose="020B0604020202020204" pitchFamily="34" charset="0"/>
                 <a:cs typeface="Arial" panose="020B0604020202020204" pitchFamily="34" charset="0"/>
               </a:rPr>
               <a:t>Xem danh sách phòng của khu trọ, cập nhật thông tin phòng</a:t>
             </a:r>
-            <a:endParaRPr lang="en-US" altLang="en-US" sz="2000" smtClean="0">
+            <a:endParaRPr lang="en-US" altLang="en-US" sz="2000">
               <a:latin typeface="Arial" panose="020B0604020202020204" pitchFamily="34" charset="0"/>
               <a:cs typeface="Arial" panose="020B0604020202020204" pitchFamily="34" charset="0"/>
             </a:endParaRPr>
@@ -10881,13 +11250,6 @@
   <p:clrMapOvr>
     <a:masterClrMapping/>
   </p:clrMapOvr>
-  <p:timing>
-    <p:tnLst>
-      <p:par>
-        <p:cTn id="1" dur="indefinite" restart="never" nodeType="tmRoot"/>
-      </p:par>
-    </p:tnLst>
-  </p:timing>
 </p:sld>
 </file>
 
@@ -10939,24 +11301,14 @@
               </a:lnSpc>
             </a:pPr>
             <a:r>
-              <a:rPr lang="en-US" sz="3200" b="1" smtClean="0">
+              <a:rPr lang="en-US" sz="3200" b="1">
                 <a:solidFill>
                   <a:schemeClr val="bg1"/>
                 </a:solidFill>
                 <a:latin typeface="Arial" panose="020B0604020202020204" pitchFamily="34" charset="0"/>
                 <a:cs typeface="Arial" panose="020B0604020202020204" pitchFamily="34" charset="0"/>
               </a:rPr>
-              <a:t>HỆ </a:t>
-            </a:r>
-            <a:r>
-              <a:rPr lang="en-US" sz="3200" b="1">
-                <a:solidFill>
-                  <a:schemeClr val="bg1"/>
-                </a:solidFill>
-                <a:latin typeface="Arial" panose="020B0604020202020204" pitchFamily="34" charset="0"/>
-                <a:cs typeface="Arial" panose="020B0604020202020204" pitchFamily="34" charset="0"/>
-              </a:rPr>
-              <a:t>THỐNG</a:t>
+              <a:t>HỆ THỐNG</a:t>
             </a:r>
             <a:r>
               <a:rPr lang="en-US" altLang="en-US" sz="3200" b="1">
@@ -11002,18 +11354,11 @@
               <a:buNone/>
             </a:pPr>
             <a:r>
-              <a:rPr lang="en-US" sz="3200" b="1" smtClean="0">
-                <a:latin typeface="Arial" panose="020B0604020202020204" pitchFamily="34" charset="0"/>
-                <a:cs typeface="Arial" panose="020B0604020202020204" pitchFamily="34" charset="0"/>
-              </a:rPr>
-              <a:t>1</a:t>
-            </a:r>
-            <a:r>
               <a:rPr lang="en-US" sz="3200" b="1">
                 <a:latin typeface="Arial" panose="020B0604020202020204" pitchFamily="34" charset="0"/>
                 <a:cs typeface="Arial" panose="020B0604020202020204" pitchFamily="34" charset="0"/>
               </a:rPr>
-              <a:t>. </a:t>
+              <a:t>1. </a:t>
             </a:r>
             <a:r>
               <a:rPr lang="en-US" altLang="en-US" sz="3200" b="1">
@@ -11581,20 +11926,20 @@
               <a:buNone/>
             </a:pPr>
             <a:r>
-              <a:rPr lang="" altLang="en-US" sz="2400" smtClean="0">
+              <a:rPr lang="en-US" altLang="en-US" sz="2400">
                 <a:latin typeface="Arial" panose="020B0604020202020204" pitchFamily="34" charset="0"/>
                 <a:cs typeface="Arial" panose="020B0604020202020204" pitchFamily="34" charset="0"/>
               </a:rPr>
               <a:t> </a:t>
             </a:r>
             <a:r>
-              <a:rPr lang="en-US" altLang="en-US" sz="2400" b="1" smtClean="0">
+              <a:rPr lang="en-US" altLang="en-US" sz="2400" b="1">
                 <a:latin typeface="Arial" panose="020B0604020202020204" pitchFamily="34" charset="0"/>
                 <a:cs typeface="Arial" panose="020B0604020202020204" pitchFamily="34" charset="0"/>
               </a:rPr>
               <a:t>Phân hệ loại phòng:</a:t>
             </a:r>
-            <a:endParaRPr lang="en-US" altLang="en-US" sz="2400" b="1" smtClean="0">
+            <a:endParaRPr lang="en-US" altLang="en-US" sz="2400" b="1">
               <a:latin typeface="Arial" panose="020B0604020202020204" pitchFamily="34" charset="0"/>
               <a:cs typeface="Arial" panose="020B0604020202020204" pitchFamily="34" charset="0"/>
             </a:endParaRPr>
@@ -11614,13 +11959,13 @@
               <a:buChar char="•"/>
             </a:pPr>
             <a:r>
-              <a:rPr lang="en-US" altLang="en-US" sz="2000" smtClean="0">
+              <a:rPr lang="en-US" altLang="en-US" sz="2000">
                 <a:latin typeface="Arial" panose="020B0604020202020204" pitchFamily="34" charset="0"/>
                 <a:cs typeface="Arial" panose="020B0604020202020204" pitchFamily="34" charset="0"/>
               </a:rPr>
               <a:t>Thông tin các loại phòng và mức giá</a:t>
             </a:r>
-            <a:endParaRPr lang="en-US" altLang="en-US" sz="2000" smtClean="0">
+            <a:endParaRPr lang="en-US" altLang="en-US" sz="2000">
               <a:latin typeface="Arial" panose="020B0604020202020204" pitchFamily="34" charset="0"/>
               <a:cs typeface="Arial" panose="020B0604020202020204" pitchFamily="34" charset="0"/>
             </a:endParaRPr>
@@ -11640,13 +11985,13 @@
               <a:buChar char="•"/>
             </a:pPr>
             <a:r>
-              <a:rPr lang="en-US" altLang="en-US" sz="2000" smtClean="0">
+              <a:rPr lang="en-US" altLang="en-US" sz="2000">
                 <a:latin typeface="Arial" panose="020B0604020202020204" pitchFamily="34" charset="0"/>
                 <a:cs typeface="Arial" panose="020B0604020202020204" pitchFamily="34" charset="0"/>
               </a:rPr>
               <a:t>Thêm, sửa, xóa thông tin loại phòng</a:t>
             </a:r>
-            <a:endParaRPr lang="en-US" altLang="en-US" sz="2000" smtClean="0">
+            <a:endParaRPr lang="en-US" altLang="en-US" sz="2000">
               <a:latin typeface="Arial" panose="020B0604020202020204" pitchFamily="34" charset="0"/>
               <a:cs typeface="Arial" panose="020B0604020202020204" pitchFamily="34" charset="0"/>
             </a:endParaRPr>
@@ -11688,13 +12033,6 @@
   <p:clrMapOvr>
     <a:masterClrMapping/>
   </p:clrMapOvr>
-  <p:timing>
-    <p:tnLst>
-      <p:par>
-        <p:cTn id="1" dur="indefinite" restart="never" nodeType="tmRoot"/>
-      </p:par>
-    </p:tnLst>
-  </p:timing>
 </p:sld>
 </file>
 
@@ -11746,24 +12084,14 @@
               </a:lnSpc>
             </a:pPr>
             <a:r>
-              <a:rPr lang="en-US" sz="3200" b="1" smtClean="0">
+              <a:rPr lang="en-US" sz="3200" b="1">
                 <a:solidFill>
                   <a:schemeClr val="bg1"/>
                 </a:solidFill>
                 <a:latin typeface="Arial" panose="020B0604020202020204" pitchFamily="34" charset="0"/>
                 <a:cs typeface="Arial" panose="020B0604020202020204" pitchFamily="34" charset="0"/>
               </a:rPr>
-              <a:t>HỆ </a:t>
-            </a:r>
-            <a:r>
-              <a:rPr lang="en-US" sz="3200" b="1">
-                <a:solidFill>
-                  <a:schemeClr val="bg1"/>
-                </a:solidFill>
-                <a:latin typeface="Arial" panose="020B0604020202020204" pitchFamily="34" charset="0"/>
-                <a:cs typeface="Arial" panose="020B0604020202020204" pitchFamily="34" charset="0"/>
-              </a:rPr>
-              <a:t>THỐNG</a:t>
+              <a:t>HỆ THỐNG</a:t>
             </a:r>
             <a:r>
               <a:rPr lang="en-US" altLang="en-US" sz="3200" b="1">
@@ -11809,18 +12137,11 @@
               <a:buNone/>
             </a:pPr>
             <a:r>
-              <a:rPr lang="en-US" sz="3200" b="1" smtClean="0">
-                <a:latin typeface="Arial" panose="020B0604020202020204" pitchFamily="34" charset="0"/>
-                <a:cs typeface="Arial" panose="020B0604020202020204" pitchFamily="34" charset="0"/>
-              </a:rPr>
-              <a:t>1</a:t>
-            </a:r>
-            <a:r>
               <a:rPr lang="en-US" sz="3200" b="1">
                 <a:latin typeface="Arial" panose="020B0604020202020204" pitchFamily="34" charset="0"/>
                 <a:cs typeface="Arial" panose="020B0604020202020204" pitchFamily="34" charset="0"/>
               </a:rPr>
-              <a:t>. </a:t>
+              <a:t>1. </a:t>
             </a:r>
             <a:r>
               <a:rPr lang="en-US" altLang="en-US" sz="3200" b="1">
@@ -12388,20 +12709,20 @@
               <a:buNone/>
             </a:pPr>
             <a:r>
-              <a:rPr lang="" altLang="en-US" sz="2400" smtClean="0">
+              <a:rPr lang="en-US" altLang="en-US" sz="2400">
                 <a:latin typeface="Arial" panose="020B0604020202020204" pitchFamily="34" charset="0"/>
                 <a:cs typeface="Arial" panose="020B0604020202020204" pitchFamily="34" charset="0"/>
               </a:rPr>
               <a:t> </a:t>
             </a:r>
             <a:r>
-              <a:rPr lang="en-US" altLang="en-US" sz="2400" b="1" smtClean="0">
+              <a:rPr lang="en-US" altLang="en-US" sz="2400" b="1">
                 <a:latin typeface="Arial" panose="020B0604020202020204" pitchFamily="34" charset="0"/>
                 <a:cs typeface="Arial" panose="020B0604020202020204" pitchFamily="34" charset="0"/>
               </a:rPr>
               <a:t>Phân hệ tài khoản:</a:t>
             </a:r>
-            <a:endParaRPr lang="en-US" altLang="en-US" sz="2400" b="1" smtClean="0">
+            <a:endParaRPr lang="en-US" altLang="en-US" sz="2400" b="1">
               <a:latin typeface="Arial" panose="020B0604020202020204" pitchFamily="34" charset="0"/>
               <a:cs typeface="Arial" panose="020B0604020202020204" pitchFamily="34" charset="0"/>
             </a:endParaRPr>
@@ -12421,13 +12742,13 @@
               <a:buChar char="•"/>
             </a:pPr>
             <a:r>
-              <a:rPr lang="en-US" altLang="en-US" sz="2000" smtClean="0">
+              <a:rPr lang="en-US" altLang="en-US" sz="2000">
                 <a:latin typeface="Arial" panose="020B0604020202020204" pitchFamily="34" charset="0"/>
                 <a:cs typeface="Arial" panose="020B0604020202020204" pitchFamily="34" charset="0"/>
               </a:rPr>
               <a:t>Dùng thêm, thay đổi thông tin các quản trị viên đang có trong hệ thống</a:t>
             </a:r>
-            <a:endParaRPr lang="en-US" altLang="en-US" sz="2000" smtClean="0">
+            <a:endParaRPr lang="en-US" altLang="en-US" sz="2000">
               <a:latin typeface="Arial" panose="020B0604020202020204" pitchFamily="34" charset="0"/>
               <a:cs typeface="Arial" panose="020B0604020202020204" pitchFamily="34" charset="0"/>
             </a:endParaRPr>
@@ -12469,13 +12790,6 @@
   <p:clrMapOvr>
     <a:masterClrMapping/>
   </p:clrMapOvr>
-  <p:timing>
-    <p:tnLst>
-      <p:par>
-        <p:cTn id="1" dur="indefinite" restart="never" nodeType="tmRoot"/>
-      </p:par>
-    </p:tnLst>
-  </p:timing>
 </p:sld>
 </file>
 
@@ -12527,24 +12841,14 @@
               </a:lnSpc>
             </a:pPr>
             <a:r>
-              <a:rPr lang="en-US" sz="3200" b="1" smtClean="0">
+              <a:rPr lang="en-US" sz="3200" b="1">
                 <a:solidFill>
                   <a:schemeClr val="bg1"/>
                 </a:solidFill>
                 <a:latin typeface="Arial" panose="020B0604020202020204" pitchFamily="34" charset="0"/>
                 <a:cs typeface="Arial" panose="020B0604020202020204" pitchFamily="34" charset="0"/>
               </a:rPr>
-              <a:t>HỆ </a:t>
-            </a:r>
-            <a:r>
-              <a:rPr lang="en-US" sz="3200" b="1">
-                <a:solidFill>
-                  <a:schemeClr val="bg1"/>
-                </a:solidFill>
-                <a:latin typeface="Arial" panose="020B0604020202020204" pitchFamily="34" charset="0"/>
-                <a:cs typeface="Arial" panose="020B0604020202020204" pitchFamily="34" charset="0"/>
-              </a:rPr>
-              <a:t>THỐNG</a:t>
+              <a:t>HỆ THỐNG</a:t>
             </a:r>
             <a:r>
               <a:rPr lang="en-US" altLang="en-US" sz="3200" b="1">
@@ -12590,25 +12894,18 @@
               <a:buNone/>
             </a:pPr>
             <a:r>
+              <a:rPr lang="en-US" sz="3200" b="1">
+                <a:latin typeface="Arial" panose="020B0604020202020204" pitchFamily="34" charset="0"/>
+                <a:cs typeface="Arial" panose="020B0604020202020204" pitchFamily="34" charset="0"/>
+              </a:rPr>
+              <a:t>1. </a:t>
+            </a:r>
+            <a:r>
               <a:rPr lang="en-US" altLang="en-US" sz="3200" b="1">
                 <a:latin typeface="Arial" panose="020B0604020202020204" pitchFamily="34" charset="0"/>
                 <a:cs typeface="Arial" panose="020B0604020202020204" pitchFamily="34" charset="0"/>
               </a:rPr>
-              <a:t>2</a:t>
-            </a:r>
-            <a:r>
-              <a:rPr lang="en-US" sz="3200" b="1">
-                <a:latin typeface="Arial" panose="020B0604020202020204" pitchFamily="34" charset="0"/>
-                <a:cs typeface="Arial" panose="020B0604020202020204" pitchFamily="34" charset="0"/>
-              </a:rPr>
-              <a:t>. </a:t>
-            </a:r>
-            <a:r>
-              <a:rPr lang="en-US" altLang="en-US" sz="3200" b="1">
-                <a:latin typeface="Arial" panose="020B0604020202020204" pitchFamily="34" charset="0"/>
-                <a:cs typeface="Arial" panose="020B0604020202020204" pitchFamily="34" charset="0"/>
-              </a:rPr>
-              <a:t>Công nghệ sử dụng</a:t>
+              <a:t>Mô tả hệ thống (6)</a:t>
             </a:r>
             <a:endParaRPr lang="en-US" altLang="en-US" sz="3200" b="1">
               <a:latin typeface="Arial" panose="020B0604020202020204" pitchFamily="34" charset="0"/>
@@ -12751,8 +13048,8 @@
         </p:nvSpPr>
         <p:spPr>
           <a:xfrm>
-            <a:off x="0" y="2395643"/>
-            <a:ext cx="12192000" cy="3810604"/>
+            <a:off x="0" y="2395855"/>
+            <a:ext cx="6132830" cy="3810635"/>
           </a:xfrm>
           <a:prstGeom prst="rect">
             <a:avLst/>
@@ -12979,8 +13276,8 @@
         </p:nvSpPr>
         <p:spPr>
           <a:xfrm>
-            <a:off x="443641" y="2111498"/>
-            <a:ext cx="11304494" cy="4095384"/>
+            <a:off x="443865" y="1933575"/>
+            <a:ext cx="11379200" cy="4787265"/>
           </a:xfrm>
           <a:prstGeom prst="rect">
             <a:avLst/>
@@ -13155,7 +13452,7 @@
             </a:lvl9pPr>
           </a:lstStyle>
           <a:p>
-            <a:pPr algn="just">
+            <a:pPr marL="0" indent="0" algn="l">
               <a:lnSpc>
                 <a:spcPct val="114000"/>
               </a:lnSpc>
@@ -13165,37 +13462,23 @@
               <a:spcAft>
                 <a:spcPts val="600"/>
               </a:spcAft>
-              <a:buFont typeface="Arial" panose="020B0604020202020204" pitchFamily="34" charset="0"/>
-              <a:buChar char="•"/>
+              <a:buFontTx/>
+              <a:buNone/>
             </a:pPr>
             <a:r>
-              <a:rPr lang="en-US" altLang="en-US" sz="2000" b="1" smtClean="0">
+              <a:rPr lang="en-US" altLang="en-US" sz="2000" b="1">
                 <a:latin typeface="Arial" panose="020B0604020202020204" pitchFamily="34" charset="0"/>
                 <a:cs typeface="Arial" panose="020B0604020202020204" pitchFamily="34" charset="0"/>
               </a:rPr>
-              <a:t>Diva</a:t>
-            </a:r>
-            <a:r>
-              <a:rPr lang="" altLang="en-US" sz="2000" b="1" smtClean="0">
-                <a:latin typeface="Arial" panose="020B0604020202020204" pitchFamily="34" charset="0"/>
-                <a:cs typeface="Arial" panose="020B0604020202020204" pitchFamily="34" charset="0"/>
-              </a:rPr>
-              <a:t>-Gis: </a:t>
-            </a:r>
-            <a:r>
-              <a:rPr lang="" altLang="en-US" sz="2000" smtClean="0">
-                <a:latin typeface="Arial" panose="020B0604020202020204" pitchFamily="34" charset="0"/>
-                <a:cs typeface="Arial" panose="020B0604020202020204" pitchFamily="34" charset="0"/>
-              </a:rPr>
-              <a:t>Trang cung cấp dữ liệu bản đồ và địa giới. Dùng để truy xuất dữ liệu địa giới Việt Nam</a:t>
-            </a:r>
-            <a:endParaRPr lang="" altLang="en-US" sz="2000" smtClean="0">
+              <a:t>Lược đồ cơ sở dữ liệu</a:t>
+            </a:r>
+            <a:endParaRPr lang="en-US" altLang="en-US" sz="1600" b="1">
               <a:latin typeface="Arial" panose="020B0604020202020204" pitchFamily="34" charset="0"/>
               <a:cs typeface="Arial" panose="020B0604020202020204" pitchFamily="34" charset="0"/>
             </a:endParaRPr>
           </a:p>
           <a:p>
-            <a:pPr algn="just">
+            <a:pPr marL="0" indent="0" algn="l">
               <a:lnSpc>
                 <a:spcPct val="114000"/>
               </a:lnSpc>
@@ -13205,30 +13488,44 @@
               <a:spcAft>
                 <a:spcPts val="600"/>
               </a:spcAft>
-              <a:buFont typeface="Arial" panose="020B0604020202020204" pitchFamily="34" charset="0"/>
-              <a:buChar char="•"/>
+              <a:buFontTx/>
+              <a:buNone/>
             </a:pPr>
             <a:r>
-              <a:rPr lang="" altLang="en-US" sz="2000" b="1" smtClean="0">
+              <a:rPr lang="en-US" altLang="en-US" sz="1600" b="1">
                 <a:latin typeface="Arial" panose="020B0604020202020204" pitchFamily="34" charset="0"/>
                 <a:cs typeface="Arial" panose="020B0604020202020204" pitchFamily="34" charset="0"/>
               </a:rPr>
-              <a:t>QGis:</a:t>
-            </a:r>
-            <a:r>
-              <a:rPr lang="" altLang="en-US" sz="2000" smtClean="0">
+              <a:t>CHU_TRO </a:t>
+            </a:r>
+            <a:r>
+              <a:rPr lang="en-US" altLang="en-US" sz="1600">
                 <a:latin typeface="Arial" panose="020B0604020202020204" pitchFamily="34" charset="0"/>
                 <a:cs typeface="Arial" panose="020B0604020202020204" pitchFamily="34" charset="0"/>
               </a:rPr>
-              <a:t> Phần mềm tháo tác dữ liệu không gian địa lý. Dùng trích xuất địa giới, bản đồ các phường trong quận Cái Răng</a:t>
-            </a:r>
-            <a:endParaRPr lang="" altLang="en-US" sz="2000" smtClean="0">
+              <a:t>(</a:t>
+            </a:r>
+            <a:r>
+              <a:rPr lang="en-US" altLang="en-US" sz="1600" b="1" u="sng">
+                <a:latin typeface="Arial" panose="020B0604020202020204" pitchFamily="34" charset="0"/>
+                <a:cs typeface="Arial" panose="020B0604020202020204" pitchFamily="34" charset="0"/>
+              </a:rPr>
+              <a:t>cmnd</a:t>
+            </a:r>
+            <a:r>
+              <a:rPr lang="en-US" altLang="en-US" sz="1600">
+                <a:latin typeface="Arial" panose="020B0604020202020204" pitchFamily="34" charset="0"/>
+                <a:cs typeface="Arial" panose="020B0604020202020204" pitchFamily="34" charset="0"/>
+              </a:rPr>
+              <a:t>, hoten, sdt, gioitinh): Lưu thông tin các chủ trọ</a:t>
+            </a:r>
+            <a:endParaRPr lang="en-US" altLang="en-US" sz="1600">
               <a:latin typeface="Arial" panose="020B0604020202020204" pitchFamily="34" charset="0"/>
               <a:cs typeface="Arial" panose="020B0604020202020204" pitchFamily="34" charset="0"/>
             </a:endParaRPr>
           </a:p>
           <a:p>
-            <a:pPr algn="just">
+            <a:pPr marL="0" indent="0" algn="l">
               <a:lnSpc>
                 <a:spcPct val="114000"/>
               </a:lnSpc>
@@ -13238,49 +13535,44 @@
               <a:spcAft>
                 <a:spcPts val="600"/>
               </a:spcAft>
-              <a:buFont typeface="Arial" panose="020B0604020202020204" pitchFamily="34" charset="0"/>
-              <a:buChar char="•"/>
+              <a:buFontTx/>
+              <a:buNone/>
             </a:pPr>
             <a:r>
-              <a:rPr lang="en-US" altLang="en-US" sz="2000" b="1" smtClean="0">
+              <a:rPr lang="en-US" altLang="en-US" sz="1600" b="1">
                 <a:latin typeface="Arial" panose="020B0604020202020204" pitchFamily="34" charset="0"/>
                 <a:cs typeface="Arial" panose="020B0604020202020204" pitchFamily="34" charset="0"/>
-                <a:sym typeface="+mn-ea"/>
-              </a:rPr>
-              <a:t>Google basemap layers</a:t>
-            </a:r>
-            <a:r>
-              <a:rPr lang="en-US" altLang="en-US" sz="2000" smtClean="0">
+              </a:rPr>
+              <a:t>DIAGIOIHANHCHINH </a:t>
+            </a:r>
+            <a:r>
+              <a:rPr lang="en-US" altLang="en-US" sz="1600">
                 <a:latin typeface="Arial" panose="020B0604020202020204" pitchFamily="34" charset="0"/>
                 <a:cs typeface="Arial" panose="020B0604020202020204" pitchFamily="34" charset="0"/>
-                <a:sym typeface="+mn-ea"/>
-              </a:rPr>
-              <a:t>: </a:t>
-            </a:r>
-            <a:r>
-              <a:rPr lang="" altLang="en-US" sz="2000" smtClean="0">
+              </a:rPr>
+              <a:t>(</a:t>
+            </a:r>
+            <a:r>
+              <a:rPr lang="en-US" altLang="en-US" sz="1600" b="1" u="sng">
                 <a:latin typeface="Arial" panose="020B0604020202020204" pitchFamily="34" charset="0"/>
                 <a:cs typeface="Arial" panose="020B0604020202020204" pitchFamily="34" charset="0"/>
-                <a:sym typeface="+mn-ea"/>
-              </a:rPr>
-              <a:t>D</a:t>
-            </a:r>
-            <a:r>
-              <a:rPr lang="en-US" altLang="en-US" sz="2000" smtClean="0">
+              </a:rPr>
+              <a:t>IDPhuong</a:t>
+            </a:r>
+            <a:r>
+              <a:rPr lang="en-US" altLang="en-US" sz="1600">
                 <a:latin typeface="Arial" panose="020B0604020202020204" pitchFamily="34" charset="0"/>
                 <a:cs typeface="Arial" panose="020B0604020202020204" pitchFamily="34" charset="0"/>
-                <a:sym typeface="+mn-ea"/>
-              </a:rPr>
-              <a:t>ùng làm bản đồ nền cho hệ thống</a:t>
-            </a:r>
-            <a:endParaRPr lang="en-US" altLang="en-US" sz="2000" smtClean="0">
+              </a:rPr>
+              <a:t>, DiaGioi, TenPhuong): Lưu dữ liệu địa giới hành chính của từng phường trong quận Cái Răng</a:t>
+            </a:r>
+            <a:endParaRPr lang="en-US" altLang="en-US" sz="1600">
               <a:latin typeface="Arial" panose="020B0604020202020204" pitchFamily="34" charset="0"/>
               <a:cs typeface="Arial" panose="020B0604020202020204" pitchFamily="34" charset="0"/>
-              <a:sym typeface="+mn-ea"/>
             </a:endParaRPr>
           </a:p>
           <a:p>
-            <a:pPr algn="just">
+            <a:pPr marL="0" indent="0" algn="l">
               <a:lnSpc>
                 <a:spcPct val="114000"/>
               </a:lnSpc>
@@ -13290,30 +13582,44 @@
               <a:spcAft>
                 <a:spcPts val="600"/>
               </a:spcAft>
-              <a:buFont typeface="Arial" panose="020B0604020202020204" pitchFamily="34" charset="0"/>
-              <a:buChar char="•"/>
+              <a:buFontTx/>
+              <a:buNone/>
             </a:pPr>
             <a:r>
-              <a:rPr lang="" altLang="en-US" sz="2000" b="1" smtClean="0">
+              <a:rPr lang="en-US" altLang="en-US" sz="1600" b="1">
                 <a:latin typeface="Arial" panose="020B0604020202020204" pitchFamily="34" charset="0"/>
                 <a:cs typeface="Arial" panose="020B0604020202020204" pitchFamily="34" charset="0"/>
               </a:rPr>
-              <a:t>Leaflet: </a:t>
-            </a:r>
-            <a:r>
-              <a:rPr lang="" altLang="en-US" sz="2000" smtClean="0">
+              <a:t>KCACH </a:t>
+            </a:r>
+            <a:r>
+              <a:rPr lang="en-US" altLang="en-US" sz="1600">
                 <a:latin typeface="Arial" panose="020B0604020202020204" pitchFamily="34" charset="0"/>
                 <a:cs typeface="Arial" panose="020B0604020202020204" pitchFamily="34" charset="0"/>
               </a:rPr>
-              <a:t>Thư viện tương tác bản đồ. Dùng tạo, điều chỉnh, thống kê và hiển thị kết quả lên trang bản đồ.</a:t>
-            </a:r>
-            <a:endParaRPr lang="" altLang="en-US" sz="2000" smtClean="0">
+              <a:t>(</a:t>
+            </a:r>
+            <a:r>
+              <a:rPr lang="en-US" altLang="en-US" sz="1600" b="1" u="sng">
+                <a:latin typeface="Arial" panose="020B0604020202020204" pitchFamily="34" charset="0"/>
+                <a:cs typeface="Arial" panose="020B0604020202020204" pitchFamily="34" charset="0"/>
+              </a:rPr>
+              <a:t>id_tro, id_truong</a:t>
+            </a:r>
+            <a:r>
+              <a:rPr lang="en-US" altLang="en-US" sz="1600">
+                <a:latin typeface="Arial" panose="020B0604020202020204" pitchFamily="34" charset="0"/>
+                <a:cs typeface="Arial" panose="020B0604020202020204" pitchFamily="34" charset="0"/>
+              </a:rPr>
+              <a:t>, kcach): Lưu khoảng cách từ từng khu trọ đến từng trường đã có trong csdl</a:t>
+            </a:r>
+            <a:endParaRPr lang="en-US" altLang="en-US" sz="1600">
               <a:latin typeface="Arial" panose="020B0604020202020204" pitchFamily="34" charset="0"/>
               <a:cs typeface="Arial" panose="020B0604020202020204" pitchFamily="34" charset="0"/>
             </a:endParaRPr>
           </a:p>
           <a:p>
-            <a:pPr algn="just">
+            <a:pPr marL="0" indent="0" algn="l">
               <a:lnSpc>
                 <a:spcPct val="114000"/>
               </a:lnSpc>
@@ -13323,24 +13629,254 @@
               <a:spcAft>
                 <a:spcPts val="600"/>
               </a:spcAft>
-              <a:buFont typeface="Arial" panose="020B0604020202020204" pitchFamily="34" charset="0"/>
-              <a:buChar char="•"/>
+              <a:buFontTx/>
+              <a:buNone/>
             </a:pPr>
             <a:r>
-              <a:rPr lang="" altLang="en-US" sz="2000" b="1" smtClean="0">
+              <a:rPr lang="en-US" altLang="en-US" sz="1600" b="1">
                 <a:latin typeface="Arial" panose="020B0604020202020204" pitchFamily="34" charset="0"/>
                 <a:cs typeface="Arial" panose="020B0604020202020204" pitchFamily="34" charset="0"/>
               </a:rPr>
-              <a:t>ArcGIS World Geocoding Service: </a:t>
-            </a:r>
-            <a:r>
-              <a:rPr lang="" altLang="en-US" sz="2000" smtClean="0">
+              <a:t>KHU_TRO </a:t>
+            </a:r>
+            <a:r>
+              <a:rPr lang="en-US" altLang="en-US" sz="1600">
                 <a:latin typeface="Arial" panose="020B0604020202020204" pitchFamily="34" charset="0"/>
                 <a:cs typeface="Arial" panose="020B0604020202020204" pitchFamily="34" charset="0"/>
               </a:rPr>
-              <a:t>Api truy vấn địa chỉ từ tọa độ. Dùng tìm địa chỉ khi người dùng chọn vị trí lúc thêm hoặc cập nhật thông tin khu trọ.</a:t>
-            </a:r>
-            <a:endParaRPr lang="" altLang="en-US" sz="2000" smtClean="0">
+              <a:t>(</a:t>
+            </a:r>
+            <a:r>
+              <a:rPr lang="en-US" altLang="en-US" sz="1600" b="1" u="sng">
+                <a:latin typeface="Arial" panose="020B0604020202020204" pitchFamily="34" charset="0"/>
+                <a:cs typeface="Arial" panose="020B0604020202020204" pitchFamily="34" charset="0"/>
+              </a:rPr>
+              <a:t>id</a:t>
+            </a:r>
+            <a:r>
+              <a:rPr lang="en-US" altLang="en-US" sz="1600">
+                <a:latin typeface="Arial" panose="020B0604020202020204" pitchFamily="34" charset="0"/>
+                <a:cs typeface="Arial" panose="020B0604020202020204" pitchFamily="34" charset="0"/>
+              </a:rPr>
+              <a:t>, ten, so_nha, tenduong, phuongxa, quanhuyen, tinh, lat, lng, </a:t>
+            </a:r>
+            <a:r>
+              <a:rPr lang="en-US" altLang="en-US" sz="1600" b="1">
+                <a:latin typeface="Arial" panose="020B0604020202020204" pitchFamily="34" charset="0"/>
+                <a:cs typeface="Arial" panose="020B0604020202020204" pitchFamily="34" charset="0"/>
+              </a:rPr>
+              <a:t>cmnd</a:t>
+            </a:r>
+            <a:r>
+              <a:rPr lang="en-US" altLang="en-US" sz="1600">
+                <a:latin typeface="Arial" panose="020B0604020202020204" pitchFamily="34" charset="0"/>
+                <a:cs typeface="Arial" panose="020B0604020202020204" pitchFamily="34" charset="0"/>
+              </a:rPr>
+              <a:t>): Lưu các thông tin của một khu trọ và tham chiếu cmnd chủ trọ</a:t>
+            </a:r>
+            <a:endParaRPr lang="en-US" altLang="en-US" sz="1600">
+              <a:latin typeface="Arial" panose="020B0604020202020204" pitchFamily="34" charset="0"/>
+              <a:cs typeface="Arial" panose="020B0604020202020204" pitchFamily="34" charset="0"/>
+            </a:endParaRPr>
+          </a:p>
+          <a:p>
+            <a:pPr marL="0" indent="0" algn="l">
+              <a:lnSpc>
+                <a:spcPct val="114000"/>
+              </a:lnSpc>
+              <a:spcBef>
+                <a:spcPts val="600"/>
+              </a:spcBef>
+              <a:spcAft>
+                <a:spcPts val="600"/>
+              </a:spcAft>
+              <a:buFontTx/>
+              <a:buNone/>
+            </a:pPr>
+            <a:r>
+              <a:rPr lang="en-US" altLang="en-US" sz="1600" b="1">
+                <a:latin typeface="Arial" panose="020B0604020202020204" pitchFamily="34" charset="0"/>
+                <a:cs typeface="Arial" panose="020B0604020202020204" pitchFamily="34" charset="0"/>
+              </a:rPr>
+              <a:t>LOAI_PHONG </a:t>
+            </a:r>
+            <a:r>
+              <a:rPr lang="en-US" altLang="en-US" sz="1600">
+                <a:latin typeface="Arial" panose="020B0604020202020204" pitchFamily="34" charset="0"/>
+                <a:cs typeface="Arial" panose="020B0604020202020204" pitchFamily="34" charset="0"/>
+              </a:rPr>
+              <a:t>(</a:t>
+            </a:r>
+            <a:r>
+              <a:rPr lang="en-US" altLang="en-US" sz="1600" b="1" u="sng">
+                <a:latin typeface="Arial" panose="020B0604020202020204" pitchFamily="34" charset="0"/>
+                <a:cs typeface="Arial" panose="020B0604020202020204" pitchFamily="34" charset="0"/>
+              </a:rPr>
+              <a:t>maloai</a:t>
+            </a:r>
+            <a:r>
+              <a:rPr lang="en-US" altLang="en-US" sz="1600">
+                <a:latin typeface="Arial" panose="020B0604020202020204" pitchFamily="34" charset="0"/>
+                <a:cs typeface="Arial" panose="020B0604020202020204" pitchFamily="34" charset="0"/>
+              </a:rPr>
+              <a:t>, ten_loai, so_nguoi, dien_tich, gia): Lưu thông tin các loại phòng. </a:t>
+            </a:r>
+            <a:endParaRPr lang="en-US" altLang="en-US" sz="1600">
+              <a:latin typeface="Arial" panose="020B0604020202020204" pitchFamily="34" charset="0"/>
+              <a:cs typeface="Arial" panose="020B0604020202020204" pitchFamily="34" charset="0"/>
+            </a:endParaRPr>
+          </a:p>
+          <a:p>
+            <a:pPr marL="0" indent="0" algn="l">
+              <a:lnSpc>
+                <a:spcPct val="114000"/>
+              </a:lnSpc>
+              <a:spcBef>
+                <a:spcPts val="600"/>
+              </a:spcBef>
+              <a:spcAft>
+                <a:spcPts val="600"/>
+              </a:spcAft>
+              <a:buFontTx/>
+              <a:buNone/>
+            </a:pPr>
+            <a:r>
+              <a:rPr lang="en-US" altLang="en-US" sz="1600" b="1">
+                <a:latin typeface="Arial" panose="020B0604020202020204" pitchFamily="34" charset="0"/>
+                <a:cs typeface="Arial" panose="020B0604020202020204" pitchFamily="34" charset="0"/>
+              </a:rPr>
+              <a:t>PHONG </a:t>
+            </a:r>
+            <a:r>
+              <a:rPr lang="en-US" altLang="en-US" sz="1600">
+                <a:latin typeface="Arial" panose="020B0604020202020204" pitchFamily="34" charset="0"/>
+                <a:cs typeface="Arial" panose="020B0604020202020204" pitchFamily="34" charset="0"/>
+              </a:rPr>
+              <a:t>(</a:t>
+            </a:r>
+            <a:r>
+              <a:rPr lang="en-US" altLang="en-US" sz="1600" b="1" u="sng">
+                <a:latin typeface="Arial" panose="020B0604020202020204" pitchFamily="34" charset="0"/>
+                <a:cs typeface="Arial" panose="020B0604020202020204" pitchFamily="34" charset="0"/>
+              </a:rPr>
+              <a:t>stt</a:t>
+            </a:r>
+            <a:r>
+              <a:rPr lang="en-US" altLang="en-US" sz="1600">
+                <a:latin typeface="Arial" panose="020B0604020202020204" pitchFamily="34" charset="0"/>
+                <a:cs typeface="Arial" panose="020B0604020202020204" pitchFamily="34" charset="0"/>
+              </a:rPr>
+              <a:t>, maloai, </a:t>
+            </a:r>
+            <a:r>
+              <a:rPr lang="en-US" altLang="en-US" sz="1600" b="1">
+                <a:latin typeface="Arial" panose="020B0604020202020204" pitchFamily="34" charset="0"/>
+                <a:cs typeface="Arial" panose="020B0604020202020204" pitchFamily="34" charset="0"/>
+              </a:rPr>
+              <a:t>id_khu_tro</a:t>
+            </a:r>
+            <a:r>
+              <a:rPr lang="en-US" altLang="en-US" sz="1600">
+                <a:latin typeface="Arial" panose="020B0604020202020204" pitchFamily="34" charset="0"/>
+                <a:cs typeface="Arial" panose="020B0604020202020204" pitchFamily="34" charset="0"/>
+              </a:rPr>
+              <a:t>, trang_thai): Lưu thông tin trạng thái của phòng theo khu trọ và loại phòng</a:t>
+            </a:r>
+            <a:endParaRPr lang="en-US" altLang="en-US" sz="1600">
+              <a:latin typeface="Arial" panose="020B0604020202020204" pitchFamily="34" charset="0"/>
+              <a:cs typeface="Arial" panose="020B0604020202020204" pitchFamily="34" charset="0"/>
+            </a:endParaRPr>
+          </a:p>
+          <a:p>
+            <a:pPr marL="0" indent="0" algn="l">
+              <a:lnSpc>
+                <a:spcPct val="114000"/>
+              </a:lnSpc>
+              <a:spcBef>
+                <a:spcPts val="600"/>
+              </a:spcBef>
+              <a:spcAft>
+                <a:spcPts val="600"/>
+              </a:spcAft>
+              <a:buFontTx/>
+              <a:buNone/>
+            </a:pPr>
+            <a:r>
+              <a:rPr lang="en-US" altLang="en-US" sz="1600" b="1">
+                <a:latin typeface="Arial" panose="020B0604020202020204" pitchFamily="34" charset="0"/>
+                <a:cs typeface="Arial" panose="020B0604020202020204" pitchFamily="34" charset="0"/>
+              </a:rPr>
+              <a:t>TAI_KHOAN </a:t>
+            </a:r>
+            <a:r>
+              <a:rPr lang="en-US" altLang="en-US" sz="1600">
+                <a:latin typeface="Arial" panose="020B0604020202020204" pitchFamily="34" charset="0"/>
+                <a:cs typeface="Arial" panose="020B0604020202020204" pitchFamily="34" charset="0"/>
+              </a:rPr>
+              <a:t>(</a:t>
+            </a:r>
+            <a:r>
+              <a:rPr lang="en-US" altLang="en-US" sz="1600" b="1" u="sng">
+                <a:latin typeface="Arial" panose="020B0604020202020204" pitchFamily="34" charset="0"/>
+                <a:cs typeface="Arial" panose="020B0604020202020204" pitchFamily="34" charset="0"/>
+              </a:rPr>
+              <a:t>uname</a:t>
+            </a:r>
+            <a:r>
+              <a:rPr lang="en-US" altLang="en-US" sz="1600">
+                <a:latin typeface="Arial" panose="020B0604020202020204" pitchFamily="34" charset="0"/>
+                <a:cs typeface="Arial" panose="020B0604020202020204" pitchFamily="34" charset="0"/>
+              </a:rPr>
+              <a:t>, hoten, pass): Lưu thông tin tài khoản các quản trị viên. (Tài khoản và mật khẩu mặc định là admin - admin) </a:t>
+            </a:r>
+            <a:endParaRPr lang="en-US" altLang="en-US" sz="1600">
+              <a:latin typeface="Arial" panose="020B0604020202020204" pitchFamily="34" charset="0"/>
+              <a:cs typeface="Arial" panose="020B0604020202020204" pitchFamily="34" charset="0"/>
+            </a:endParaRPr>
+          </a:p>
+          <a:p>
+            <a:pPr marL="0" indent="0" algn="l">
+              <a:lnSpc>
+                <a:spcPct val="114000"/>
+              </a:lnSpc>
+              <a:spcBef>
+                <a:spcPts val="600"/>
+              </a:spcBef>
+              <a:spcAft>
+                <a:spcPts val="600"/>
+              </a:spcAft>
+              <a:buFontTx/>
+              <a:buNone/>
+            </a:pPr>
+            <a:r>
+              <a:rPr lang="en-US" altLang="en-US" sz="1600" b="1">
+                <a:latin typeface="Arial" panose="020B0604020202020204" pitchFamily="34" charset="0"/>
+                <a:cs typeface="Arial" panose="020B0604020202020204" pitchFamily="34" charset="0"/>
+              </a:rPr>
+              <a:t>TRUONG </a:t>
+            </a:r>
+            <a:r>
+              <a:rPr lang="en-US" altLang="en-US" sz="1600">
+                <a:latin typeface="Arial" panose="020B0604020202020204" pitchFamily="34" charset="0"/>
+                <a:cs typeface="Arial" panose="020B0604020202020204" pitchFamily="34" charset="0"/>
+              </a:rPr>
+              <a:t>(</a:t>
+            </a:r>
+            <a:r>
+              <a:rPr lang="en-US" altLang="en-US" sz="1600" b="1" u="sng">
+                <a:latin typeface="Arial" panose="020B0604020202020204" pitchFamily="34" charset="0"/>
+                <a:cs typeface="Arial" panose="020B0604020202020204" pitchFamily="34" charset="0"/>
+              </a:rPr>
+              <a:t>id</a:t>
+            </a:r>
+            <a:r>
+              <a:rPr lang="en-US" altLang="en-US" sz="1600">
+                <a:latin typeface="Arial" panose="020B0604020202020204" pitchFamily="34" charset="0"/>
+                <a:cs typeface="Arial" panose="020B0604020202020204" pitchFamily="34" charset="0"/>
+              </a:rPr>
+              <a:t>, ten, diachi, lat, lng, icon_path): Lưu thông tin các trường đại học, cao đẳng trên địa bàn Cần Thơ</a:t>
+            </a:r>
+            <a:endParaRPr lang="en-US" altLang="en-US" sz="1600">
               <a:latin typeface="Arial" panose="020B0604020202020204" pitchFamily="34" charset="0"/>
               <a:cs typeface="Arial" panose="020B0604020202020204" pitchFamily="34" charset="0"/>
             </a:endParaRPr>
@@ -13352,13 +13888,6 @@
   <p:clrMapOvr>
     <a:masterClrMapping/>
   </p:clrMapOvr>
-  <p:timing>
-    <p:tnLst>
-      <p:par>
-        <p:cTn id="1" dur="indefinite" restart="never" nodeType="tmRoot"/>
-      </p:par>
-    </p:tnLst>
-  </p:timing>
 </p:sld>
 </file>
 
@@ -13410,39 +13939,26 @@
               </a:lnSpc>
             </a:pPr>
             <a:r>
-              <a:rPr lang="en-US" sz="3200" b="1" smtClean="0">
+              <a:rPr lang="en-US" sz="3200" b="1">
                 <a:solidFill>
                   <a:schemeClr val="bg1"/>
                 </a:solidFill>
                 <a:latin typeface="Arial" panose="020B0604020202020204" pitchFamily="34" charset="0"/>
                 <a:cs typeface="Arial" panose="020B0604020202020204" pitchFamily="34" charset="0"/>
-                <a:sym typeface="+mn-ea"/>
-              </a:rPr>
-              <a:t>HỆ </a:t>
-            </a:r>
-            <a:r>
-              <a:rPr lang="en-US" sz="3200" b="1">
+              </a:rPr>
+              <a:t>HỆ THỐNG</a:t>
+            </a:r>
+            <a:r>
+              <a:rPr lang="en-US" altLang="en-US" sz="3200" b="1">
                 <a:solidFill>
                   <a:schemeClr val="bg1"/>
                 </a:solidFill>
                 <a:latin typeface="Arial" panose="020B0604020202020204" pitchFamily="34" charset="0"/>
                 <a:cs typeface="Arial" panose="020B0604020202020204" pitchFamily="34" charset="0"/>
-                <a:sym typeface="+mn-ea"/>
-              </a:rPr>
-              <a:t>THỐNG</a:t>
-            </a:r>
-            <a:r>
-              <a:rPr lang="en-US" altLang="en-US" sz="3200" b="1">
-                <a:solidFill>
-                  <a:schemeClr val="bg1"/>
-                </a:solidFill>
-                <a:latin typeface="Arial" panose="020B0604020202020204" pitchFamily="34" charset="0"/>
-                <a:cs typeface="Arial" panose="020B0604020202020204" pitchFamily="34" charset="0"/>
-                <a:sym typeface="+mn-ea"/>
               </a:rPr>
               <a:t> QUẢN LÝ KHU TRỌ QUẬN CÁI RĂNG</a:t>
             </a:r>
-            <a:endParaRPr lang="en-US" sz="3200" b="1">
+            <a:endParaRPr lang="en-US" altLang="en-US" sz="3200" b="1">
               <a:solidFill>
                 <a:schemeClr val="bg1"/>
               </a:solidFill>
@@ -13476,25 +13992,25 @@
               <a:buNone/>
             </a:pPr>
             <a:r>
-              <a:rPr lang="en-US" altLang="en-US" sz="3200" b="1" smtClean="0">
-                <a:latin typeface="Arial" panose="020B0604020202020204" pitchFamily="34" charset="0"/>
-                <a:cs typeface="Arial" panose="020B0604020202020204" pitchFamily="34" charset="0"/>
-              </a:rPr>
-              <a:t>3</a:t>
-            </a:r>
-            <a:r>
-              <a:rPr lang="en-US" sz="3200" b="1" smtClean="0">
-                <a:latin typeface="Arial" panose="020B0604020202020204" pitchFamily="34" charset="0"/>
-                <a:cs typeface="Arial" panose="020B0604020202020204" pitchFamily="34" charset="0"/>
-              </a:rPr>
-              <a:t>. </a:t>
-            </a:r>
-            <a:r>
               <a:rPr lang="en-US" altLang="en-US" sz="3200" b="1">
                 <a:latin typeface="Arial" panose="020B0604020202020204" pitchFamily="34" charset="0"/>
                 <a:cs typeface="Arial" panose="020B0604020202020204" pitchFamily="34" charset="0"/>
               </a:rPr>
-              <a:t>Demo</a:t>
+              <a:t>2</a:t>
+            </a:r>
+            <a:r>
+              <a:rPr lang="en-US" sz="3200" b="1">
+                <a:latin typeface="Arial" panose="020B0604020202020204" pitchFamily="34" charset="0"/>
+                <a:cs typeface="Arial" panose="020B0604020202020204" pitchFamily="34" charset="0"/>
+              </a:rPr>
+              <a:t>. </a:t>
+            </a:r>
+            <a:r>
+              <a:rPr lang="en-US" altLang="en-US" sz="3200" b="1">
+                <a:latin typeface="Arial" panose="020B0604020202020204" pitchFamily="34" charset="0"/>
+                <a:cs typeface="Arial" panose="020B0604020202020204" pitchFamily="34" charset="0"/>
+              </a:rPr>
+              <a:t>Công nghệ sử dụng</a:t>
             </a:r>
             <a:endParaRPr lang="en-US" altLang="en-US" sz="3200" b="1">
               <a:latin typeface="Arial" panose="020B0604020202020204" pitchFamily="34" charset="0"/>
@@ -13548,7 +14064,10 @@
             </a:lvl1pPr>
           </a:lstStyle>
           <a:p>
-            <a:pPr marL="342900" indent="-342900">
+            <a:pPr marL="342900" indent="-342900" algn="l">
+              <a:buClrTx/>
+              <a:buSzTx/>
+              <a:buFontTx/>
               <a:buAutoNum type="arabicPeriod"/>
             </a:pPr>
             <a:r>
@@ -13560,20 +14079,9 @@
                 </a:solidFill>
                 <a:latin typeface="Arial" panose="020B0604020202020204" pitchFamily="34" charset="0"/>
                 <a:cs typeface="Arial" panose="020B0604020202020204" pitchFamily="34" charset="0"/>
-              </a:rPr>
-              <a:t>Mô tả hệ thống</a:t>
-            </a:r>
-            <a:r>
-              <a:rPr lang="vi-VN" sz="1800" b="1">
-                <a:solidFill>
-                  <a:schemeClr val="bg2">
-                    <a:lumMod val="50000"/>
-                  </a:schemeClr>
-                </a:solidFill>
-                <a:latin typeface="Arial" panose="020B0604020202020204" pitchFamily="34" charset="0"/>
-                <a:cs typeface="Arial" panose="020B0604020202020204" pitchFamily="34" charset="0"/>
-              </a:rPr>
-              <a:t> </a:t>
+                <a:sym typeface="+mn-ea"/>
+              </a:rPr>
+              <a:t>Mô tả hệ thống </a:t>
             </a:r>
             <a:endParaRPr lang="en-US" sz="1800" b="1">
               <a:solidFill>
@@ -13586,6 +14094,32 @@
             </a:endParaRPr>
           </a:p>
           <a:p>
+            <a:pPr marL="342900" indent="-342900" algn="l">
+              <a:buClrTx/>
+              <a:buSzTx/>
+              <a:buFontTx/>
+              <a:buAutoNum type="arabicPeriod"/>
+            </a:pPr>
+            <a:r>
+              <a:rPr lang="en-US" altLang="en-US" sz="1800" b="1">
+                <a:solidFill>
+                  <a:schemeClr val="bg1"/>
+                </a:solidFill>
+                <a:latin typeface="Arial" panose="020B0604020202020204" pitchFamily="34" charset="0"/>
+                <a:cs typeface="Arial" panose="020B0604020202020204" pitchFamily="34" charset="0"/>
+                <a:sym typeface="+mn-ea"/>
+              </a:rPr>
+              <a:t>Công nghệ sử dụng</a:t>
+            </a:r>
+            <a:endParaRPr lang="en-US" altLang="en-US" sz="1800" b="1">
+              <a:solidFill>
+                <a:schemeClr val="bg1"/>
+              </a:solidFill>
+              <a:latin typeface="Arial" panose="020B0604020202020204" pitchFamily="34" charset="0"/>
+              <a:cs typeface="Arial" panose="020B0604020202020204" pitchFamily="34" charset="0"/>
+            </a:endParaRPr>
+          </a:p>
+          <a:p>
             <a:pPr marL="342900" indent="-342900">
               <a:buAutoNum type="arabicPeriod"/>
             </a:pPr>
@@ -13598,8 +14132,9 @@
                 </a:solidFill>
                 <a:latin typeface="Arial" panose="020B0604020202020204" pitchFamily="34" charset="0"/>
                 <a:cs typeface="Arial" panose="020B0604020202020204" pitchFamily="34" charset="0"/>
-              </a:rPr>
-              <a:t>Công nghệ sử dụng</a:t>
+                <a:sym typeface="+mn-ea"/>
+              </a:rPr>
+              <a:t>Demo</a:t>
             </a:r>
             <a:endParaRPr lang="en-US" sz="1800" b="1">
               <a:solidFill>
@@ -13611,28 +14146,6 @@
               <a:cs typeface="Arial" panose="020B0604020202020204" pitchFamily="34" charset="0"/>
             </a:endParaRPr>
           </a:p>
-          <a:p>
-            <a:pPr marL="342900" indent="-342900">
-              <a:buAutoNum type="arabicPeriod"/>
-            </a:pPr>
-            <a:r>
-              <a:rPr lang="en-US" altLang="en-US" sz="1800" b="1">
-                <a:solidFill>
-                  <a:schemeClr val="bg1"/>
-                </a:solidFill>
-                <a:latin typeface="Arial" panose="020B0604020202020204" pitchFamily="34" charset="0"/>
-                <a:cs typeface="Arial" panose="020B0604020202020204" pitchFamily="34" charset="0"/>
-              </a:rPr>
-              <a:t>Demo</a:t>
-            </a:r>
-            <a:endParaRPr lang="en-US" altLang="en-US" sz="1800" b="1">
-              <a:solidFill>
-                <a:schemeClr val="bg1"/>
-              </a:solidFill>
-              <a:latin typeface="Arial" panose="020B0604020202020204" pitchFamily="34" charset="0"/>
-              <a:cs typeface="Arial" panose="020B0604020202020204" pitchFamily="34" charset="0"/>
-            </a:endParaRPr>
-          </a:p>
         </p:txBody>
       </p:sp>
       <p:sp>
@@ -13863,42 +14376,364 @@
           </a:p>
         </p:txBody>
       </p:sp>
-      <p:pic>
-        <p:nvPicPr>
-          <p:cNvPr id="6" name="Picture 5"/>
-          <p:cNvPicPr>
-            <a:picLocks noChangeAspect="true"/>
-          </p:cNvPicPr>
+      <p:sp>
+        <p:nvSpPr>
+          <p:cNvPr id="9" name="Content Placeholder 2"/>
+          <p:cNvSpPr txBox="true"/>
           <p:nvPr/>
-        </p:nvPicPr>
-        <p:blipFill>
-          <a:blip r:embed="rId1"/>
-          <a:stretch>
-            <a:fillRect/>
-          </a:stretch>
-        </p:blipFill>
+        </p:nvSpPr>
         <p:spPr>
           <a:xfrm>
-            <a:off x="3269615" y="2510790"/>
-            <a:ext cx="5652770" cy="2644775"/>
+            <a:off x="443641" y="2111498"/>
+            <a:ext cx="11304494" cy="4095384"/>
           </a:xfrm>
           <a:prstGeom prst="rect">
             <a:avLst/>
           </a:prstGeom>
         </p:spPr>
-      </p:pic>
+        <p:txBody>
+          <a:bodyPr vert="horz" lIns="91440" tIns="45720" rIns="91440" bIns="45720" rtlCol="0">
+            <a:noAutofit/>
+          </a:bodyPr>
+          <a:lstStyle>
+            <a:lvl1pPr marL="228600" indent="-228600" algn="l" defTabSz="914400" rtl="0" eaLnBrk="1" latinLnBrk="0" hangingPunct="1">
+              <a:lnSpc>
+                <a:spcPct val="90000"/>
+              </a:lnSpc>
+              <a:spcBef>
+                <a:spcPts val="1000"/>
+              </a:spcBef>
+              <a:buFont typeface="Arial" panose="020B0604020202020204" pitchFamily="34" charset="0"/>
+              <a:buChar char="•"/>
+              <a:defRPr sz="2800" kern="1200">
+                <a:solidFill>
+                  <a:schemeClr val="tx1"/>
+                </a:solidFill>
+                <a:latin typeface="+mn-lt"/>
+                <a:ea typeface="+mn-ea"/>
+                <a:cs typeface="+mn-cs"/>
+              </a:defRPr>
+            </a:lvl1pPr>
+            <a:lvl2pPr marL="685800" indent="-228600" algn="l" defTabSz="914400" rtl="0" eaLnBrk="1" latinLnBrk="0" hangingPunct="1">
+              <a:lnSpc>
+                <a:spcPct val="90000"/>
+              </a:lnSpc>
+              <a:spcBef>
+                <a:spcPts val="500"/>
+              </a:spcBef>
+              <a:buFont typeface="Arial" panose="020B0604020202020204" pitchFamily="34" charset="0"/>
+              <a:buChar char="•"/>
+              <a:defRPr sz="2400" kern="1200">
+                <a:solidFill>
+                  <a:schemeClr val="tx1"/>
+                </a:solidFill>
+                <a:latin typeface="+mn-lt"/>
+                <a:ea typeface="+mn-ea"/>
+                <a:cs typeface="+mn-cs"/>
+              </a:defRPr>
+            </a:lvl2pPr>
+            <a:lvl3pPr marL="1143000" indent="-228600" algn="l" defTabSz="914400" rtl="0" eaLnBrk="1" latinLnBrk="0" hangingPunct="1">
+              <a:lnSpc>
+                <a:spcPct val="90000"/>
+              </a:lnSpc>
+              <a:spcBef>
+                <a:spcPts val="500"/>
+              </a:spcBef>
+              <a:buFont typeface="Arial" panose="020B0604020202020204" pitchFamily="34" charset="0"/>
+              <a:buChar char="•"/>
+              <a:defRPr sz="2000" kern="1200">
+                <a:solidFill>
+                  <a:schemeClr val="tx1"/>
+                </a:solidFill>
+                <a:latin typeface="+mn-lt"/>
+                <a:ea typeface="+mn-ea"/>
+                <a:cs typeface="+mn-cs"/>
+              </a:defRPr>
+            </a:lvl3pPr>
+            <a:lvl4pPr marL="1600200" indent="-228600" algn="l" defTabSz="914400" rtl="0" eaLnBrk="1" latinLnBrk="0" hangingPunct="1">
+              <a:lnSpc>
+                <a:spcPct val="90000"/>
+              </a:lnSpc>
+              <a:spcBef>
+                <a:spcPts val="500"/>
+              </a:spcBef>
+              <a:buFont typeface="Arial" panose="020B0604020202020204" pitchFamily="34" charset="0"/>
+              <a:buChar char="•"/>
+              <a:defRPr sz="1800" kern="1200">
+                <a:solidFill>
+                  <a:schemeClr val="tx1"/>
+                </a:solidFill>
+                <a:latin typeface="+mn-lt"/>
+                <a:ea typeface="+mn-ea"/>
+                <a:cs typeface="+mn-cs"/>
+              </a:defRPr>
+            </a:lvl4pPr>
+            <a:lvl5pPr marL="2057400" indent="-228600" algn="l" defTabSz="914400" rtl="0" eaLnBrk="1" latinLnBrk="0" hangingPunct="1">
+              <a:lnSpc>
+                <a:spcPct val="90000"/>
+              </a:lnSpc>
+              <a:spcBef>
+                <a:spcPts val="500"/>
+              </a:spcBef>
+              <a:buFont typeface="Arial" panose="020B0604020202020204" pitchFamily="34" charset="0"/>
+              <a:buChar char="•"/>
+              <a:defRPr sz="1800" kern="1200">
+                <a:solidFill>
+                  <a:schemeClr val="tx1"/>
+                </a:solidFill>
+                <a:latin typeface="+mn-lt"/>
+                <a:ea typeface="+mn-ea"/>
+                <a:cs typeface="+mn-cs"/>
+              </a:defRPr>
+            </a:lvl5pPr>
+            <a:lvl6pPr marL="2514600" indent="-228600" algn="l" defTabSz="914400" rtl="0" eaLnBrk="1" latinLnBrk="0" hangingPunct="1">
+              <a:lnSpc>
+                <a:spcPct val="90000"/>
+              </a:lnSpc>
+              <a:spcBef>
+                <a:spcPts val="500"/>
+              </a:spcBef>
+              <a:buFont typeface="Arial" panose="020B0604020202020204" pitchFamily="34" charset="0"/>
+              <a:buChar char="•"/>
+              <a:defRPr sz="1800" kern="1200">
+                <a:solidFill>
+                  <a:schemeClr val="tx1"/>
+                </a:solidFill>
+                <a:latin typeface="+mn-lt"/>
+                <a:ea typeface="+mn-ea"/>
+                <a:cs typeface="+mn-cs"/>
+              </a:defRPr>
+            </a:lvl6pPr>
+            <a:lvl7pPr marL="2971800" indent="-228600" algn="l" defTabSz="914400" rtl="0" eaLnBrk="1" latinLnBrk="0" hangingPunct="1">
+              <a:lnSpc>
+                <a:spcPct val="90000"/>
+              </a:lnSpc>
+              <a:spcBef>
+                <a:spcPts val="500"/>
+              </a:spcBef>
+              <a:buFont typeface="Arial" panose="020B0604020202020204" pitchFamily="34" charset="0"/>
+              <a:buChar char="•"/>
+              <a:defRPr sz="1800" kern="1200">
+                <a:solidFill>
+                  <a:schemeClr val="tx1"/>
+                </a:solidFill>
+                <a:latin typeface="+mn-lt"/>
+                <a:ea typeface="+mn-ea"/>
+                <a:cs typeface="+mn-cs"/>
+              </a:defRPr>
+            </a:lvl7pPr>
+            <a:lvl8pPr marL="3429000" indent="-228600" algn="l" defTabSz="914400" rtl="0" eaLnBrk="1" latinLnBrk="0" hangingPunct="1">
+              <a:lnSpc>
+                <a:spcPct val="90000"/>
+              </a:lnSpc>
+              <a:spcBef>
+                <a:spcPts val="500"/>
+              </a:spcBef>
+              <a:buFont typeface="Arial" panose="020B0604020202020204" pitchFamily="34" charset="0"/>
+              <a:buChar char="•"/>
+              <a:defRPr sz="1800" kern="1200">
+                <a:solidFill>
+                  <a:schemeClr val="tx1"/>
+                </a:solidFill>
+                <a:latin typeface="+mn-lt"/>
+                <a:ea typeface="+mn-ea"/>
+                <a:cs typeface="+mn-cs"/>
+              </a:defRPr>
+            </a:lvl8pPr>
+            <a:lvl9pPr marL="3886200" indent="-228600" algn="l" defTabSz="914400" rtl="0" eaLnBrk="1" latinLnBrk="0" hangingPunct="1">
+              <a:lnSpc>
+                <a:spcPct val="90000"/>
+              </a:lnSpc>
+              <a:spcBef>
+                <a:spcPts val="500"/>
+              </a:spcBef>
+              <a:buFont typeface="Arial" panose="020B0604020202020204" pitchFamily="34" charset="0"/>
+              <a:buChar char="•"/>
+              <a:defRPr sz="1800" kern="1200">
+                <a:solidFill>
+                  <a:schemeClr val="tx1"/>
+                </a:solidFill>
+                <a:latin typeface="+mn-lt"/>
+                <a:ea typeface="+mn-ea"/>
+                <a:cs typeface="+mn-cs"/>
+              </a:defRPr>
+            </a:lvl9pPr>
+          </a:lstStyle>
+          <a:p>
+            <a:pPr algn="just">
+              <a:lnSpc>
+                <a:spcPct val="114000"/>
+              </a:lnSpc>
+              <a:spcBef>
+                <a:spcPts val="600"/>
+              </a:spcBef>
+              <a:spcAft>
+                <a:spcPts val="600"/>
+              </a:spcAft>
+              <a:buFont typeface="Arial" panose="020B0604020202020204" pitchFamily="34" charset="0"/>
+              <a:buChar char="•"/>
+            </a:pPr>
+            <a:r>
+              <a:rPr lang="en-US" altLang="en-US" sz="2000" b="1">
+                <a:latin typeface="Arial" panose="020B0604020202020204" pitchFamily="34" charset="0"/>
+                <a:cs typeface="Arial" panose="020B0604020202020204" pitchFamily="34" charset="0"/>
+              </a:rPr>
+              <a:t>Diva-Gis: </a:t>
+            </a:r>
+            <a:r>
+              <a:rPr lang="en-US" altLang="en-US" sz="2000">
+                <a:latin typeface="Arial" panose="020B0604020202020204" pitchFamily="34" charset="0"/>
+                <a:cs typeface="Arial" panose="020B0604020202020204" pitchFamily="34" charset="0"/>
+              </a:rPr>
+              <a:t>Trang cung cấp dữ liệu bản đồ và địa giới. Dùng để truy xuất dữ liệu địa giới Việt Nam</a:t>
+            </a:r>
+            <a:endParaRPr lang="en-US" altLang="en-US" sz="2000">
+              <a:latin typeface="Arial" panose="020B0604020202020204" pitchFamily="34" charset="0"/>
+              <a:cs typeface="Arial" panose="020B0604020202020204" pitchFamily="34" charset="0"/>
+            </a:endParaRPr>
+          </a:p>
+          <a:p>
+            <a:pPr algn="just">
+              <a:lnSpc>
+                <a:spcPct val="114000"/>
+              </a:lnSpc>
+              <a:spcBef>
+                <a:spcPts val="600"/>
+              </a:spcBef>
+              <a:spcAft>
+                <a:spcPts val="600"/>
+              </a:spcAft>
+              <a:buFont typeface="Arial" panose="020B0604020202020204" pitchFamily="34" charset="0"/>
+              <a:buChar char="•"/>
+            </a:pPr>
+            <a:r>
+              <a:rPr lang="en-US" altLang="en-US" sz="2000" b="1">
+                <a:latin typeface="Arial" panose="020B0604020202020204" pitchFamily="34" charset="0"/>
+                <a:cs typeface="Arial" panose="020B0604020202020204" pitchFamily="34" charset="0"/>
+              </a:rPr>
+              <a:t>QGis:</a:t>
+            </a:r>
+            <a:r>
+              <a:rPr lang="en-US" altLang="en-US" sz="2000">
+                <a:latin typeface="Arial" panose="020B0604020202020204" pitchFamily="34" charset="0"/>
+                <a:cs typeface="Arial" panose="020B0604020202020204" pitchFamily="34" charset="0"/>
+              </a:rPr>
+              <a:t> Phần mềm thao tác dữ liệu không gian địa lý. Dùng trích xuất địa giới, bản đồ các phường trong quận Cái Răng</a:t>
+            </a:r>
+            <a:endParaRPr lang="en-US" altLang="en-US" sz="2000">
+              <a:latin typeface="Arial" panose="020B0604020202020204" pitchFamily="34" charset="0"/>
+              <a:cs typeface="Arial" panose="020B0604020202020204" pitchFamily="34" charset="0"/>
+            </a:endParaRPr>
+          </a:p>
+          <a:p>
+            <a:pPr algn="just">
+              <a:lnSpc>
+                <a:spcPct val="114000"/>
+              </a:lnSpc>
+              <a:spcBef>
+                <a:spcPts val="600"/>
+              </a:spcBef>
+              <a:spcAft>
+                <a:spcPts val="600"/>
+              </a:spcAft>
+              <a:buFont typeface="Arial" panose="020B0604020202020204" pitchFamily="34" charset="0"/>
+              <a:buChar char="•"/>
+            </a:pPr>
+            <a:r>
+              <a:rPr lang="en-US" altLang="en-US" sz="2000" b="1">
+                <a:latin typeface="Arial" panose="020B0604020202020204" pitchFamily="34" charset="0"/>
+                <a:cs typeface="Arial" panose="020B0604020202020204" pitchFamily="34" charset="0"/>
+                <a:sym typeface="+mn-ea"/>
+              </a:rPr>
+              <a:t>Google basemap layers</a:t>
+            </a:r>
+            <a:r>
+              <a:rPr lang="en-US" altLang="en-US" sz="2000">
+                <a:latin typeface="Arial" panose="020B0604020202020204" pitchFamily="34" charset="0"/>
+                <a:cs typeface="Arial" panose="020B0604020202020204" pitchFamily="34" charset="0"/>
+                <a:sym typeface="+mn-ea"/>
+              </a:rPr>
+              <a:t>: Dùng làm bản đồ nền cho hệ thống</a:t>
+            </a:r>
+            <a:endParaRPr lang="en-US" altLang="en-US" sz="2000">
+              <a:latin typeface="Arial" panose="020B0604020202020204" pitchFamily="34" charset="0"/>
+              <a:cs typeface="Arial" panose="020B0604020202020204" pitchFamily="34" charset="0"/>
+              <a:sym typeface="+mn-ea"/>
+            </a:endParaRPr>
+          </a:p>
+          <a:p>
+            <a:pPr algn="just">
+              <a:lnSpc>
+                <a:spcPct val="114000"/>
+              </a:lnSpc>
+              <a:spcBef>
+                <a:spcPts val="600"/>
+              </a:spcBef>
+              <a:spcAft>
+                <a:spcPts val="600"/>
+              </a:spcAft>
+              <a:buFont typeface="Arial" panose="020B0604020202020204" pitchFamily="34" charset="0"/>
+              <a:buChar char="•"/>
+            </a:pPr>
+            <a:r>
+              <a:rPr lang="en-US" altLang="en-US" sz="2000" b="1">
+                <a:latin typeface="Arial" panose="020B0604020202020204" pitchFamily="34" charset="0"/>
+                <a:cs typeface="Arial" panose="020B0604020202020204" pitchFamily="34" charset="0"/>
+              </a:rPr>
+              <a:t>Leaflet: </a:t>
+            </a:r>
+            <a:r>
+              <a:rPr lang="en-US" altLang="en-US" sz="2000">
+                <a:latin typeface="Arial" panose="020B0604020202020204" pitchFamily="34" charset="0"/>
+                <a:cs typeface="Arial" panose="020B0604020202020204" pitchFamily="34" charset="0"/>
+              </a:rPr>
+              <a:t>Thư viện tương tác bản đồ. Dùng tạo, điều chỉnh, thống kê và hiển thị kết quả lên trang bản đồ.</a:t>
+            </a:r>
+            <a:endParaRPr lang="en-US" altLang="en-US" sz="2000">
+              <a:latin typeface="Arial" panose="020B0604020202020204" pitchFamily="34" charset="0"/>
+              <a:cs typeface="Arial" panose="020B0604020202020204" pitchFamily="34" charset="0"/>
+            </a:endParaRPr>
+          </a:p>
+          <a:p>
+            <a:pPr algn="just">
+              <a:lnSpc>
+                <a:spcPct val="114000"/>
+              </a:lnSpc>
+              <a:spcBef>
+                <a:spcPts val="600"/>
+              </a:spcBef>
+              <a:spcAft>
+                <a:spcPts val="600"/>
+              </a:spcAft>
+              <a:buFont typeface="Arial" panose="020B0604020202020204" pitchFamily="34" charset="0"/>
+              <a:buChar char="•"/>
+            </a:pPr>
+            <a:r>
+              <a:rPr lang="en-US" altLang="en-US" sz="2000" b="1">
+                <a:latin typeface="Arial" panose="020B0604020202020204" pitchFamily="34" charset="0"/>
+                <a:cs typeface="Arial" panose="020B0604020202020204" pitchFamily="34" charset="0"/>
+              </a:rPr>
+              <a:t>ArcGIS World Geocoding Service: </a:t>
+            </a:r>
+            <a:r>
+              <a:rPr lang="en-US" altLang="en-US" sz="2000">
+                <a:latin typeface="Arial" panose="020B0604020202020204" pitchFamily="34" charset="0"/>
+                <a:cs typeface="Arial" panose="020B0604020202020204" pitchFamily="34" charset="0"/>
+              </a:rPr>
+              <a:t>Api truy vấn địa chỉ từ tọa độ. Dùng tìm địa chỉ khi người dùng chọn vị trí lúc thêm hoặc cập nhật thông tin khu trọ.</a:t>
+            </a:r>
+            <a:endParaRPr lang="en-US" altLang="en-US" sz="2000">
+              <a:latin typeface="Arial" panose="020B0604020202020204" pitchFamily="34" charset="0"/>
+              <a:cs typeface="Arial" panose="020B0604020202020204" pitchFamily="34" charset="0"/>
+            </a:endParaRPr>
+          </a:p>
+        </p:txBody>
+      </p:sp>
     </p:spTree>
   </p:cSld>
   <p:clrMapOvr>
     <a:masterClrMapping/>
   </p:clrMapOvr>
-  <p:timing>
-    <p:tnLst>
-      <p:par>
-        <p:cTn id="1" dur="indefinite" restart="never" nodeType="tmRoot"/>
-      </p:par>
-    </p:tnLst>
-  </p:timing>
 </p:sld>
 </file>
 

</xml_diff>